<commit_message>
Kurzes InhaltsUpdate... ohne wirklichen Inhalt
</commit_message>
<xml_diff>
--- a/final/GDV - Finale Präsentation V0.9.pptx
+++ b/final/GDV - Finale Präsentation V0.9.pptx
@@ -10,34 +10,35 @@
     <p:sldId id="258" r:id="rId4"/>
     <p:sldId id="267" r:id="rId5"/>
     <p:sldId id="268" r:id="rId6"/>
-    <p:sldId id="271" r:id="rId7"/>
-    <p:sldId id="270" r:id="rId8"/>
-    <p:sldId id="273" r:id="rId9"/>
-    <p:sldId id="274" r:id="rId10"/>
-    <p:sldId id="275" r:id="rId11"/>
-    <p:sldId id="276" r:id="rId12"/>
-    <p:sldId id="277" r:id="rId13"/>
-    <p:sldId id="278" r:id="rId14"/>
-    <p:sldId id="279" r:id="rId15"/>
-    <p:sldId id="280" r:id="rId16"/>
-    <p:sldId id="281" r:id="rId17"/>
-    <p:sldId id="282" r:id="rId18"/>
-    <p:sldId id="284" r:id="rId19"/>
-    <p:sldId id="283" r:id="rId20"/>
-    <p:sldId id="285" r:id="rId21"/>
-    <p:sldId id="260" r:id="rId22"/>
-    <p:sldId id="286" r:id="rId23"/>
-    <p:sldId id="287" r:id="rId24"/>
-    <p:sldId id="288" r:id="rId25"/>
-    <p:sldId id="289" r:id="rId26"/>
-    <p:sldId id="290" r:id="rId27"/>
-    <p:sldId id="291" r:id="rId28"/>
-    <p:sldId id="292" r:id="rId29"/>
-    <p:sldId id="293" r:id="rId30"/>
-    <p:sldId id="294" r:id="rId31"/>
-    <p:sldId id="295" r:id="rId32"/>
-    <p:sldId id="296" r:id="rId33"/>
-    <p:sldId id="272" r:id="rId34"/>
+    <p:sldId id="297" r:id="rId7"/>
+    <p:sldId id="271" r:id="rId8"/>
+    <p:sldId id="270" r:id="rId9"/>
+    <p:sldId id="273" r:id="rId10"/>
+    <p:sldId id="274" r:id="rId11"/>
+    <p:sldId id="275" r:id="rId12"/>
+    <p:sldId id="276" r:id="rId13"/>
+    <p:sldId id="277" r:id="rId14"/>
+    <p:sldId id="278" r:id="rId15"/>
+    <p:sldId id="279" r:id="rId16"/>
+    <p:sldId id="280" r:id="rId17"/>
+    <p:sldId id="281" r:id="rId18"/>
+    <p:sldId id="282" r:id="rId19"/>
+    <p:sldId id="284" r:id="rId20"/>
+    <p:sldId id="283" r:id="rId21"/>
+    <p:sldId id="285" r:id="rId22"/>
+    <p:sldId id="260" r:id="rId23"/>
+    <p:sldId id="286" r:id="rId24"/>
+    <p:sldId id="287" r:id="rId25"/>
+    <p:sldId id="288" r:id="rId26"/>
+    <p:sldId id="289" r:id="rId27"/>
+    <p:sldId id="290" r:id="rId28"/>
+    <p:sldId id="291" r:id="rId29"/>
+    <p:sldId id="292" r:id="rId30"/>
+    <p:sldId id="293" r:id="rId31"/>
+    <p:sldId id="294" r:id="rId32"/>
+    <p:sldId id="295" r:id="rId33"/>
+    <p:sldId id="296" r:id="rId34"/>
+    <p:sldId id="272" r:id="rId35"/>
   </p:sldIdLst>
   <p:sldSz cx="12192000" cy="6858000"/>
   <p:notesSz cx="6858000" cy="9144000"/>
@@ -138,7 +139,7 @@
   </p:defaultTextStyle>
   <p:extLst>
     <p:ext uri="{EFAFB233-063F-42B5-8137-9DF3F51BA10A}">
-      <p15:sldGuideLst xmlns:p15="http://schemas.microsoft.com/office/powerpoint/2012/main" xmlns="">
+      <p15:sldGuideLst xmlns="" xmlns:p15="http://schemas.microsoft.com/office/powerpoint/2012/main">
         <p15:guide id="1" orient="horz" pos="2160">
           <p15:clr>
             <a:srgbClr val="A4A3A4"/>
@@ -3755,16 +3756,12 @@
               <a:rPr lang="de-DE" dirty="0" smtClean="0"/>
             </a:br>
             <a:r>
+              <a:rPr lang="de-DE" sz="3200" dirty="0" smtClean="0"/>
+              <a:t>Power </a:t>
+            </a:r>
+            <a:r>
               <a:rPr lang="de-DE" sz="3200" dirty="0" err="1" smtClean="0"/>
-              <a:t>Collision</a:t>
-            </a:r>
-            <a:r>
-              <a:rPr lang="de-DE" sz="3200" dirty="0" smtClean="0"/>
-              <a:t> </a:t>
-            </a:r>
-            <a:r>
-              <a:rPr lang="de-DE" sz="3200" dirty="0" err="1" smtClean="0"/>
-              <a:t>Detection</a:t>
+              <a:t>Ups</a:t>
             </a:r>
             <a:endParaRPr lang="de-DE" sz="3200" dirty="0"/>
           </a:p>
@@ -3795,15 +3792,20 @@
             <a:pPr algn="just"/>
             <a:r>
               <a:rPr lang="de-DE" dirty="0" smtClean="0"/>
-              <a:t>Hauptproblem</a:t>
+              <a:t>Endergebnis</a:t>
             </a:r>
           </a:p>
           <a:p>
             <a:pPr lvl="1" algn="just"/>
             <a:r>
               <a:rPr lang="de-DE" dirty="0" smtClean="0"/>
-              <a:t>Keine „soliden“ Wände</a:t>
-            </a:r>
+              <a:t>Nur ein Einziges Power </a:t>
+            </a:r>
+            <a:r>
+              <a:rPr lang="de-DE" dirty="0" err="1" smtClean="0"/>
+              <a:t>Up</a:t>
+            </a:r>
+            <a:endParaRPr lang="de-DE" dirty="0" smtClean="0"/>
           </a:p>
         </p:txBody>
       </p:sp>
@@ -4010,15 +4012,34 @@
             <a:pPr algn="just"/>
             <a:r>
               <a:rPr lang="de-DE" sz="2400" dirty="0" smtClean="0"/>
-              <a:t>Problem</a:t>
+              <a:t>Lösung</a:t>
             </a:r>
           </a:p>
           <a:p>
             <a:pPr lvl="1" algn="just"/>
             <a:r>
               <a:rPr lang="de-DE" sz="2000" dirty="0" smtClean="0"/>
-              <a:t>Fahrzeug fährt durch die „offensichtliche“ Grenze.</a:t>
-            </a:r>
+              <a:t>Wegen neuem Konzept</a:t>
+            </a:r>
+          </a:p>
+          <a:p>
+            <a:pPr lvl="1" algn="just"/>
+            <a:r>
+              <a:rPr lang="de-DE" sz="2000" dirty="0" smtClean="0"/>
+              <a:t>Gegen die Zeit</a:t>
+            </a:r>
+          </a:p>
+          <a:p>
+            <a:pPr lvl="1" algn="just"/>
+            <a:r>
+              <a:rPr lang="de-DE" sz="2000" dirty="0" smtClean="0"/>
+              <a:t>Nur noch das Speed-Power </a:t>
+            </a:r>
+            <a:r>
+              <a:rPr lang="de-DE" sz="2000" dirty="0" err="1" smtClean="0"/>
+              <a:t>Up</a:t>
+            </a:r>
+            <a:endParaRPr lang="de-DE" sz="1600" dirty="0" smtClean="0"/>
           </a:p>
         </p:txBody>
       </p:sp>
@@ -4089,7 +4110,15 @@
             </a:r>
             <a:r>
               <a:rPr lang="de-DE" dirty="0" smtClean="0"/>
-              <a:t> Bild – „Fahrzeug“ fährt durch Wand</a:t>
+              <a:t> Bild – Speed-Power </a:t>
+            </a:r>
+            <a:r>
+              <a:rPr lang="de-DE" dirty="0" err="1" smtClean="0"/>
+              <a:t>Up</a:t>
+            </a:r>
+            <a:r>
+              <a:rPr lang="de-DE" dirty="0" smtClean="0"/>
+              <a:t> in Aktion</a:t>
             </a:r>
             <a:endParaRPr lang="de-DE" dirty="0"/>
           </a:p>
@@ -4098,7 +4127,7 @@
     </p:spTree>
     <p:extLst>
       <p:ext uri="{BB962C8B-B14F-4D97-AF65-F5344CB8AC3E}">
-        <p14:creationId xmlns:p14="http://schemas.microsoft.com/office/powerpoint/2010/main" val="748917962"/>
+        <p14:creationId xmlns:p14="http://schemas.microsoft.com/office/powerpoint/2010/main" val="4272078257"/>
       </p:ext>
     </p:extLst>
   </p:cSld>
@@ -4195,14 +4224,14 @@
             <a:pPr algn="just"/>
             <a:r>
               <a:rPr lang="de-DE" dirty="0" smtClean="0"/>
-              <a:t>Endergebnis</a:t>
+              <a:t>Hauptproblem</a:t>
             </a:r>
           </a:p>
           <a:p>
             <a:pPr lvl="1" algn="just"/>
             <a:r>
               <a:rPr lang="de-DE" dirty="0" smtClean="0"/>
-              <a:t>„Gummi“-Wand</a:t>
+              <a:t>Keine „soliden“ Wände</a:t>
             </a:r>
           </a:p>
         </p:txBody>
@@ -4218,7 +4247,7 @@
         <p:spPr bwMode="auto">
           <a:xfrm>
             <a:off x="7806519" y="2711197"/>
-            <a:ext cx="4012441" cy="3669440"/>
+            <a:ext cx="4012441" cy="2474951"/>
           </a:xfrm>
           <a:prstGeom prst="rect">
             <a:avLst/>
@@ -4410,23 +4439,15 @@
             <a:pPr algn="just"/>
             <a:r>
               <a:rPr lang="de-DE" sz="2400" dirty="0" smtClean="0"/>
-              <a:t>Lösung</a:t>
+              <a:t>Problem</a:t>
             </a:r>
           </a:p>
           <a:p>
             <a:pPr lvl="1" algn="just"/>
             <a:r>
               <a:rPr lang="de-DE" sz="2000" dirty="0" smtClean="0"/>
-              <a:t>Wand lässt Fahrzeug zurückfedern</a:t>
-            </a:r>
-          </a:p>
-          <a:p>
-            <a:pPr lvl="1" algn="just"/>
-            <a:endParaRPr lang="de-DE" sz="1400" dirty="0"/>
-          </a:p>
-          <a:p>
-            <a:pPr lvl="1" algn="just"/>
-            <a:endParaRPr lang="de-DE" sz="1400" dirty="0" smtClean="0"/>
+              <a:t>Fahrzeug fährt durch die „offensichtliche“ Grenze.</a:t>
+            </a:r>
           </a:p>
         </p:txBody>
       </p:sp>
@@ -4478,7 +4499,7 @@
         <p:spPr>
           <a:xfrm>
             <a:off x="1460314" y="6387149"/>
-            <a:ext cx="5841238" cy="369332"/>
+            <a:ext cx="3862313" cy="369332"/>
           </a:xfrm>
           <a:prstGeom prst="rect">
             <a:avLst/>
@@ -4497,7 +4518,7 @@
             </a:r>
             <a:r>
               <a:rPr lang="de-DE" dirty="0" smtClean="0"/>
-              <a:t> Bild – „Fahrzeug“ wird zurückgeworfen</a:t>
+              <a:t> Bild – „Fahrzeug“ fährt durch Wand</a:t>
             </a:r>
             <a:endParaRPr lang="de-DE" dirty="0"/>
           </a:p>
@@ -4506,7 +4527,7 @@
     </p:spTree>
     <p:extLst>
       <p:ext uri="{BB962C8B-B14F-4D97-AF65-F5344CB8AC3E}">
-        <p14:creationId xmlns:p14="http://schemas.microsoft.com/office/powerpoint/2010/main" val="2587824926"/>
+        <p14:creationId xmlns:p14="http://schemas.microsoft.com/office/powerpoint/2010/main" val="748917962"/>
       </p:ext>
     </p:extLst>
   </p:cSld>
@@ -4603,14 +4624,14 @@
             <a:pPr algn="just"/>
             <a:r>
               <a:rPr lang="de-DE" dirty="0" smtClean="0"/>
-              <a:t>Neue Probleme</a:t>
+              <a:t>Endergebnis</a:t>
             </a:r>
           </a:p>
           <a:p>
             <a:pPr lvl="1" algn="just"/>
             <a:r>
               <a:rPr lang="de-DE" dirty="0" smtClean="0"/>
-              <a:t>Grafikfehler &amp; „Ghost-Effekt“</a:t>
+              <a:t>„Gummi“-Wand</a:t>
             </a:r>
           </a:p>
         </p:txBody>
@@ -4818,36 +4839,14 @@
             <a:pPr algn="just"/>
             <a:r>
               <a:rPr lang="de-DE" sz="2400" dirty="0" smtClean="0"/>
-              <a:t>Bugs</a:t>
+              <a:t>Lösung</a:t>
             </a:r>
           </a:p>
           <a:p>
             <a:pPr lvl="1" algn="just"/>
             <a:r>
-              <a:rPr lang="de-DE" sz="1600" dirty="0"/>
-              <a:t>Neuer Bug: Bei zu starkem zurückfedern kann Spieler doch durch die Wand fahren</a:t>
-            </a:r>
-          </a:p>
-          <a:p>
-            <a:pPr lvl="1" algn="just"/>
-            <a:endParaRPr lang="de-DE" sz="1600" dirty="0"/>
-          </a:p>
-          <a:p>
-            <a:pPr lvl="1" algn="just"/>
-            <a:r>
-              <a:rPr lang="de-DE" sz="1600" dirty="0"/>
-              <a:t>Neuer Bug: Bei starker Beschleunigung, dringt das Fahrzeug ins Material der Wand ein</a:t>
-            </a:r>
-          </a:p>
-          <a:p>
-            <a:pPr lvl="1" algn="just"/>
-            <a:endParaRPr lang="de-DE" sz="1600" dirty="0"/>
-          </a:p>
-          <a:p>
-            <a:pPr lvl="1" algn="just"/>
-            <a:r>
-              <a:rPr lang="de-DE" sz="1600" dirty="0"/>
-              <a:t>Beide Bugs noch nicht behoben, wegen Zeitmangel und inkompatiblem Code</a:t>
+              <a:rPr lang="de-DE" sz="2000" dirty="0" smtClean="0"/>
+              <a:t>Wand lässt Fahrzeug zurückfedern</a:t>
             </a:r>
           </a:p>
           <a:p>
@@ -4927,7 +4926,7 @@
             </a:r>
             <a:r>
               <a:rPr lang="de-DE" dirty="0" smtClean="0"/>
-              <a:t> Bild – Dennoch durch die Wand &amp; Material Grafik Fehler</a:t>
+              <a:t> Bild – „Fahrzeug“ wird zurückgeworfen</a:t>
             </a:r>
             <a:endParaRPr lang="de-DE" dirty="0"/>
           </a:p>
@@ -4936,7 +4935,7 @@
     </p:spTree>
     <p:extLst>
       <p:ext uri="{BB962C8B-B14F-4D97-AF65-F5344CB8AC3E}">
-        <p14:creationId xmlns:p14="http://schemas.microsoft.com/office/powerpoint/2010/main" val="2601844610"/>
+        <p14:creationId xmlns:p14="http://schemas.microsoft.com/office/powerpoint/2010/main" val="2587824926"/>
       </p:ext>
     </p:extLst>
   </p:cSld>
@@ -4993,8 +4992,16 @@
               <a:rPr lang="de-DE" dirty="0" smtClean="0"/>
             </a:br>
             <a:r>
+              <a:rPr lang="de-DE" sz="3200" dirty="0" err="1" smtClean="0"/>
+              <a:t>Collision</a:t>
+            </a:r>
+            <a:r>
               <a:rPr lang="de-DE" sz="3200" dirty="0" smtClean="0"/>
-              <a:t>Checkpoints</a:t>
+              <a:t> </a:t>
+            </a:r>
+            <a:r>
+              <a:rPr lang="de-DE" sz="3200" dirty="0" err="1" smtClean="0"/>
+              <a:t>Detection</a:t>
             </a:r>
             <a:endParaRPr lang="de-DE" sz="3200" dirty="0"/>
           </a:p>
@@ -5025,14 +5032,14 @@
             <a:pPr algn="just"/>
             <a:r>
               <a:rPr lang="de-DE" dirty="0" smtClean="0"/>
-              <a:t>Hauptproblem</a:t>
+              <a:t>Neue Probleme</a:t>
             </a:r>
           </a:p>
           <a:p>
             <a:pPr lvl="1" algn="just"/>
             <a:r>
               <a:rPr lang="de-DE" dirty="0" smtClean="0"/>
-              <a:t>Checkpoints für Start/Ziel </a:t>
+              <a:t>Grafikfehler &amp; „Ghost-Effekt“</a:t>
             </a:r>
           </a:p>
         </p:txBody>
@@ -5048,7 +5055,7 @@
         <p:spPr bwMode="auto">
           <a:xfrm>
             <a:off x="7806519" y="2711197"/>
-            <a:ext cx="4012441" cy="1587848"/>
+            <a:ext cx="4012441" cy="3669440"/>
           </a:xfrm>
           <a:prstGeom prst="rect">
             <a:avLst/>
@@ -5240,16 +5247,37 @@
             <a:pPr algn="just"/>
             <a:r>
               <a:rPr lang="de-DE" sz="2400" dirty="0" smtClean="0"/>
-              <a:t>Problem</a:t>
+              <a:t>Bugs</a:t>
             </a:r>
           </a:p>
           <a:p>
             <a:pPr lvl="1" algn="just"/>
             <a:r>
-              <a:rPr lang="de-DE" sz="2000" dirty="0" smtClean="0"/>
-              <a:t>Checkpoints reagieren zwar auf Kontakt, werden aber nicht gewertet</a:t>
-            </a:r>
-            <a:endParaRPr lang="de-DE" sz="2000" dirty="0"/>
+              <a:rPr lang="de-DE" sz="1600" dirty="0"/>
+              <a:t>Neuer Bug: Bei zu starkem zurückfedern kann Spieler doch durch die Wand fahren</a:t>
+            </a:r>
+          </a:p>
+          <a:p>
+            <a:pPr lvl="1" algn="just"/>
+            <a:endParaRPr lang="de-DE" sz="1600" dirty="0"/>
+          </a:p>
+          <a:p>
+            <a:pPr lvl="1" algn="just"/>
+            <a:r>
+              <a:rPr lang="de-DE" sz="1600" dirty="0"/>
+              <a:t>Neuer Bug: Bei starker Beschleunigung, dringt das Fahrzeug ins Material der Wand ein</a:t>
+            </a:r>
+          </a:p>
+          <a:p>
+            <a:pPr lvl="1" algn="just"/>
+            <a:endParaRPr lang="de-DE" sz="1600" dirty="0"/>
+          </a:p>
+          <a:p>
+            <a:pPr lvl="1" algn="just"/>
+            <a:r>
+              <a:rPr lang="de-DE" sz="1600" dirty="0"/>
+              <a:t>Beide Bugs noch nicht behoben, wegen Zeitmangel und inkompatiblem Code</a:t>
+            </a:r>
           </a:p>
           <a:p>
             <a:pPr lvl="1" algn="just"/>
@@ -5263,13 +5291,13 @@
       </p:sp>
       <p:pic>
         <p:nvPicPr>
-          <p:cNvPr id="2050" name="Picture 2"/>
+          <p:cNvPr id="2050" name="Picture 2" descr="D:\Nils\Desktop\Tron-Light-Bike-Race.jpg"/>
           <p:cNvPicPr>
             <a:picLocks noChangeAspect="1" noChangeArrowheads="1"/>
           </p:cNvPicPr>
           <p:nvPr/>
         </p:nvPicPr>
-        <p:blipFill>
+        <p:blipFill rotWithShape="1">
           <a:blip r:embed="rId2" cstate="print">
             <a:extLst>
               <a:ext uri="{28A0092B-C50C-407E-A947-70E740481C1C}">
@@ -5277,14 +5305,13 @@
               </a:ext>
             </a:extLst>
           </a:blip>
-          <a:stretch>
-            <a:fillRect/>
-          </a:stretch>
+          <a:srcRect l="6322" r="16490"/>
+          <a:stretch/>
         </p:blipFill>
         <p:spPr bwMode="auto">
           <a:xfrm>
-            <a:off x="1435251" y="3802865"/>
-            <a:ext cx="4965549" cy="2473452"/>
+            <a:off x="1435251" y="3698545"/>
+            <a:ext cx="4965549" cy="2682092"/>
           </a:xfrm>
           <a:prstGeom prst="rect">
             <a:avLst/>
@@ -5324,8 +5351,12 @@
           <a:lstStyle/>
           <a:p>
             <a:r>
-              <a:rPr lang="de-DE" dirty="0" smtClean="0"/>
-              <a:t>Screenshot – Prototyp Checkpoint zum Testen</a:t>
+              <a:rPr lang="de-DE" dirty="0" err="1" smtClean="0"/>
+              <a:t>Gif</a:t>
+            </a:r>
+            <a:r>
+              <a:rPr lang="de-DE" dirty="0" smtClean="0"/>
+              <a:t> Bild – Dennoch durch die Wand &amp; Material Grafik Fehler</a:t>
             </a:r>
             <a:endParaRPr lang="de-DE" dirty="0"/>
           </a:p>
@@ -5334,7 +5365,7 @@
     </p:spTree>
     <p:extLst>
       <p:ext uri="{BB962C8B-B14F-4D97-AF65-F5344CB8AC3E}">
-        <p14:creationId xmlns:p14="http://schemas.microsoft.com/office/powerpoint/2010/main" val="850133919"/>
+        <p14:creationId xmlns:p14="http://schemas.microsoft.com/office/powerpoint/2010/main" val="2601844610"/>
       </p:ext>
     </p:extLst>
   </p:cSld>
@@ -5423,14 +5454,14 @@
             <a:pPr algn="just"/>
             <a:r>
               <a:rPr lang="de-DE" dirty="0" smtClean="0"/>
-              <a:t>Lösung?</a:t>
+              <a:t>Hauptproblem</a:t>
             </a:r>
           </a:p>
           <a:p>
             <a:pPr lvl="1" algn="just"/>
             <a:r>
               <a:rPr lang="de-DE" dirty="0" smtClean="0"/>
-              <a:t>Noch ausstehend…</a:t>
+              <a:t>Checkpoints für Start/Ziel </a:t>
             </a:r>
           </a:p>
         </p:txBody>
@@ -5638,14 +5669,14 @@
             <a:pPr algn="just"/>
             <a:r>
               <a:rPr lang="de-DE" sz="2400" dirty="0" smtClean="0"/>
-              <a:t>Lösung</a:t>
+              <a:t>Problem</a:t>
             </a:r>
           </a:p>
           <a:p>
             <a:pPr lvl="1" algn="just"/>
             <a:r>
               <a:rPr lang="de-DE" sz="2000" dirty="0" smtClean="0"/>
-              <a:t>…</a:t>
+              <a:t>Checkpoints reagieren zwar auf Kontakt, werden aber nicht gewertet</a:t>
             </a:r>
             <a:endParaRPr lang="de-DE" sz="2000" dirty="0"/>
           </a:p>
@@ -5708,7 +5739,7 @@
         <p:spPr>
           <a:xfrm>
             <a:off x="1460314" y="6387149"/>
-            <a:ext cx="5131555" cy="369332"/>
+            <a:ext cx="5841238" cy="369332"/>
           </a:xfrm>
           <a:prstGeom prst="rect">
             <a:avLst/>
@@ -5723,7 +5754,7 @@
           <a:p>
             <a:r>
               <a:rPr lang="de-DE" dirty="0" smtClean="0"/>
-              <a:t>Screenshot – Vogelperspektive des fertigen Levels</a:t>
+              <a:t>Screenshot – Prototyp Checkpoint zum Testen</a:t>
             </a:r>
             <a:endParaRPr lang="de-DE" dirty="0"/>
           </a:p>
@@ -5732,7 +5763,7 @@
     </p:spTree>
     <p:extLst>
       <p:ext uri="{BB962C8B-B14F-4D97-AF65-F5344CB8AC3E}">
-        <p14:creationId xmlns:p14="http://schemas.microsoft.com/office/powerpoint/2010/main" val="1767145185"/>
+        <p14:creationId xmlns:p14="http://schemas.microsoft.com/office/powerpoint/2010/main" val="850133919"/>
       </p:ext>
     </p:extLst>
   </p:cSld>
@@ -5789,8 +5820,8 @@
               <a:rPr lang="de-DE" dirty="0" smtClean="0"/>
             </a:br>
             <a:r>
-              <a:rPr lang="de-DE" sz="3200" dirty="0" err="1" smtClean="0"/>
-              <a:t>Respawn</a:t>
+              <a:rPr lang="de-DE" sz="3200" dirty="0" smtClean="0"/>
+              <a:t>Checkpoints</a:t>
             </a:r>
             <a:endParaRPr lang="de-DE" sz="3200" dirty="0"/>
           </a:p>
@@ -5821,14 +5852,14 @@
             <a:pPr algn="just"/>
             <a:r>
               <a:rPr lang="de-DE" dirty="0" smtClean="0"/>
-              <a:t>Was getan werden soll…</a:t>
+              <a:t>Lösung?</a:t>
             </a:r>
           </a:p>
           <a:p>
             <a:pPr lvl="1" algn="just"/>
             <a:r>
               <a:rPr lang="de-DE" dirty="0" smtClean="0"/>
-              <a:t>Auf Knopfdruck bzw. bei Zerstörung</a:t>
+              <a:t>Noch ausstehend…</a:t>
             </a:r>
           </a:p>
         </p:txBody>
@@ -6036,33 +6067,14 @@
             <a:pPr algn="just"/>
             <a:r>
               <a:rPr lang="de-DE" sz="2400" dirty="0" smtClean="0"/>
-              <a:t>Problem</a:t>
+              <a:t>Lösung</a:t>
             </a:r>
           </a:p>
           <a:p>
             <a:pPr lvl="1" algn="just"/>
             <a:r>
               <a:rPr lang="de-DE" sz="2000" dirty="0" smtClean="0"/>
-              <a:t>Der </a:t>
-            </a:r>
-            <a:r>
-              <a:rPr lang="de-DE" sz="2000" dirty="0" err="1" smtClean="0"/>
-              <a:t>Respawn</a:t>
-            </a:r>
-            <a:r>
-              <a:rPr lang="de-DE" sz="2000" dirty="0" smtClean="0"/>
-              <a:t> funktioniert nicht oder nur halb.</a:t>
-            </a:r>
-          </a:p>
-          <a:p>
-            <a:pPr lvl="1" algn="just"/>
-            <a:r>
-              <a:rPr lang="de-DE" sz="2000" dirty="0" err="1" smtClean="0"/>
-              <a:t>Respawn</a:t>
-            </a:r>
-            <a:r>
-              <a:rPr lang="de-DE" sz="2000" dirty="0" smtClean="0"/>
-              <a:t> auf falscher Position</a:t>
+              <a:t>…</a:t>
             </a:r>
             <a:endParaRPr lang="de-DE" sz="2000" dirty="0"/>
           </a:p>
@@ -6139,20 +6151,8 @@
           <a:lstStyle/>
           <a:p>
             <a:r>
-              <a:rPr lang="de-DE" dirty="0" err="1" smtClean="0"/>
-              <a:t>Gif</a:t>
-            </a:r>
-            <a:r>
-              <a:rPr lang="de-DE" dirty="0" smtClean="0"/>
-              <a:t> – Spieler führt einen </a:t>
-            </a:r>
-            <a:r>
-              <a:rPr lang="de-DE" dirty="0" err="1" smtClean="0"/>
-              <a:t>Respawn</a:t>
-            </a:r>
-            <a:r>
-              <a:rPr lang="de-DE" dirty="0" smtClean="0"/>
-              <a:t> aus</a:t>
+              <a:rPr lang="de-DE" dirty="0" smtClean="0"/>
+              <a:t>Screenshot – Vogelperspektive des fertigen Levels</a:t>
             </a:r>
             <a:endParaRPr lang="de-DE" dirty="0"/>
           </a:p>
@@ -6161,7 +6161,7 @@
     </p:spTree>
     <p:extLst>
       <p:ext uri="{BB962C8B-B14F-4D97-AF65-F5344CB8AC3E}">
-        <p14:creationId xmlns:p14="http://schemas.microsoft.com/office/powerpoint/2010/main" val="2615663998"/>
+        <p14:creationId xmlns:p14="http://schemas.microsoft.com/office/powerpoint/2010/main" val="1767145185"/>
       </p:ext>
     </p:extLst>
   </p:cSld>
@@ -6250,14 +6250,14 @@
             <a:pPr algn="just"/>
             <a:r>
               <a:rPr lang="de-DE" dirty="0" smtClean="0"/>
-              <a:t>Endfunktion</a:t>
+              <a:t>Was getan werden soll…</a:t>
             </a:r>
           </a:p>
           <a:p>
             <a:pPr lvl="1" algn="just"/>
             <a:r>
               <a:rPr lang="de-DE" dirty="0" smtClean="0"/>
-              <a:t>Einsatzfähig</a:t>
+              <a:t>Auf Knopfdruck bzw. bei Zerstörung</a:t>
             </a:r>
           </a:p>
         </p:txBody>
@@ -6273,7 +6273,7 @@
         <p:spPr bwMode="auto">
           <a:xfrm>
             <a:off x="7806519" y="2711197"/>
-            <a:ext cx="4012441" cy="2328394"/>
+            <a:ext cx="4012441" cy="1587848"/>
           </a:xfrm>
           <a:prstGeom prst="rect">
             <a:avLst/>
@@ -6465,38 +6465,33 @@
             <a:pPr algn="just"/>
             <a:r>
               <a:rPr lang="de-DE" sz="2400" dirty="0" smtClean="0"/>
-              <a:t>Lösung</a:t>
+              <a:t>Problem</a:t>
             </a:r>
           </a:p>
           <a:p>
             <a:pPr lvl="1" algn="just"/>
             <a:r>
               <a:rPr lang="de-DE" sz="2000" dirty="0" smtClean="0"/>
-              <a:t>Bei </a:t>
+              <a:t>Der </a:t>
             </a:r>
             <a:r>
               <a:rPr lang="de-DE" sz="2000" dirty="0" err="1" smtClean="0"/>
-              <a:t>betätigung</a:t>
+              <a:t>Respawn</a:t>
             </a:r>
             <a:r>
               <a:rPr lang="de-DE" sz="2000" dirty="0" smtClean="0"/>
-              <a:t> von „R“ wird </a:t>
-            </a:r>
+              <a:t> funktioniert nicht oder nur halb.</a:t>
+            </a:r>
+          </a:p>
+          <a:p>
+            <a:pPr lvl="1" algn="just"/>
             <a:r>
               <a:rPr lang="de-DE" sz="2000" dirty="0" err="1" smtClean="0"/>
-              <a:t>respawnt</a:t>
-            </a:r>
-            <a:endParaRPr lang="de-DE" sz="2000" dirty="0"/>
-          </a:p>
-          <a:p>
-            <a:pPr lvl="1" algn="just"/>
-            <a:endParaRPr lang="de-DE" sz="2000" dirty="0" smtClean="0"/>
-          </a:p>
-          <a:p>
-            <a:pPr lvl="1" algn="just"/>
+              <a:t>Respawn</a:t>
+            </a:r>
             <a:r>
               <a:rPr lang="de-DE" sz="2000" dirty="0" smtClean="0"/>
-              <a:t>Leider nur auf die Anfangsposition</a:t>
+              <a:t> auf falscher Position</a:t>
             </a:r>
             <a:endParaRPr lang="de-DE" sz="2000" dirty="0"/>
           </a:p>
@@ -6595,7 +6590,7 @@
     </p:spTree>
     <p:extLst>
       <p:ext uri="{BB962C8B-B14F-4D97-AF65-F5344CB8AC3E}">
-        <p14:creationId xmlns:p14="http://schemas.microsoft.com/office/powerpoint/2010/main" val="3641270933"/>
+        <p14:creationId xmlns:p14="http://schemas.microsoft.com/office/powerpoint/2010/main" val="2615663998"/>
       </p:ext>
     </p:extLst>
   </p:cSld>
@@ -6653,15 +6648,7 @@
             </a:br>
             <a:r>
               <a:rPr lang="de-DE" sz="3200" dirty="0" err="1" smtClean="0"/>
-              <a:t>Damage</a:t>
-            </a:r>
-            <a:r>
-              <a:rPr lang="de-DE" sz="3200" dirty="0" smtClean="0"/>
-              <a:t> </a:t>
-            </a:r>
-            <a:r>
-              <a:rPr lang="de-DE" sz="3200" dirty="0" err="1" smtClean="0"/>
-              <a:t>Calculation</a:t>
+              <a:t>Respawn</a:t>
             </a:r>
             <a:endParaRPr lang="de-DE" sz="3200" dirty="0"/>
           </a:p>
@@ -6692,18 +6679,14 @@
             <a:pPr algn="just"/>
             <a:r>
               <a:rPr lang="de-DE" dirty="0" smtClean="0"/>
-              <a:t>Hauptproblem</a:t>
+              <a:t>Endfunktion</a:t>
             </a:r>
           </a:p>
           <a:p>
             <a:pPr lvl="1" algn="just"/>
             <a:r>
-              <a:rPr lang="de-DE" dirty="0" err="1" smtClean="0"/>
-              <a:t>Damage</a:t>
-            </a:r>
-            <a:r>
-              <a:rPr lang="de-DE" dirty="0" smtClean="0"/>
-              <a:t> wenn es richtig ist</a:t>
+              <a:rPr lang="de-DE" dirty="0" smtClean="0"/>
+              <a:t>Einsatzfähig</a:t>
             </a:r>
           </a:p>
         </p:txBody>
@@ -6911,29 +6894,38 @@
             <a:pPr algn="just"/>
             <a:r>
               <a:rPr lang="de-DE" sz="2400" dirty="0" smtClean="0"/>
-              <a:t>Problem</a:t>
+              <a:t>Lösung</a:t>
             </a:r>
           </a:p>
           <a:p>
             <a:pPr lvl="1" algn="just"/>
             <a:r>
+              <a:rPr lang="de-DE" sz="2000" dirty="0" smtClean="0"/>
+              <a:t>Bei </a:t>
+            </a:r>
+            <a:r>
               <a:rPr lang="de-DE" sz="2000" dirty="0" err="1" smtClean="0"/>
-              <a:t>Damage</a:t>
+              <a:t>betätigung</a:t>
             </a:r>
             <a:r>
               <a:rPr lang="de-DE" sz="2000" dirty="0" smtClean="0"/>
-              <a:t> bei Zusammenstoß mit der Wand wird nicht registriert</a:t>
-            </a:r>
+              <a:t> von „R“ wird </a:t>
+            </a:r>
+            <a:r>
+              <a:rPr lang="de-DE" sz="2000" dirty="0" err="1" smtClean="0"/>
+              <a:t>respawnt</a:t>
+            </a:r>
+            <a:endParaRPr lang="de-DE" sz="2000" dirty="0"/>
           </a:p>
           <a:p>
             <a:pPr lvl="1" algn="just"/>
-            <a:r>
-              <a:rPr lang="de-DE" sz="2000" dirty="0" err="1" smtClean="0"/>
-              <a:t>Damage</a:t>
-            </a:r>
+            <a:endParaRPr lang="de-DE" sz="2000" dirty="0" smtClean="0"/>
+          </a:p>
+          <a:p>
+            <a:pPr lvl="1" algn="just"/>
             <a:r>
               <a:rPr lang="de-DE" sz="2000" dirty="0" smtClean="0"/>
-              <a:t> zu hoch oder zu niedrig</a:t>
+              <a:t>Leider nur auf die Anfangsposition</a:t>
             </a:r>
             <a:endParaRPr lang="de-DE" sz="2000" dirty="0"/>
           </a:p>
@@ -7015,11 +7007,15 @@
             </a:r>
             <a:r>
               <a:rPr lang="de-DE" dirty="0" smtClean="0"/>
-              <a:t> – Spieler erhält </a:t>
+              <a:t> – Spieler führt einen </a:t>
             </a:r>
             <a:r>
               <a:rPr lang="de-DE" dirty="0" err="1" smtClean="0"/>
-              <a:t>Damage</a:t>
+              <a:t>Respawn</a:t>
+            </a:r>
+            <a:r>
+              <a:rPr lang="de-DE" dirty="0" smtClean="0"/>
+              <a:t> aus</a:t>
             </a:r>
             <a:endParaRPr lang="de-DE" dirty="0"/>
           </a:p>
@@ -7028,7 +7024,7 @@
     </p:spTree>
     <p:extLst>
       <p:ext uri="{BB962C8B-B14F-4D97-AF65-F5344CB8AC3E}">
-        <p14:creationId xmlns:p14="http://schemas.microsoft.com/office/powerpoint/2010/main" val="2721563962"/>
+        <p14:creationId xmlns:p14="http://schemas.microsoft.com/office/powerpoint/2010/main" val="3641270933"/>
       </p:ext>
     </p:extLst>
   </p:cSld>
@@ -7125,7 +7121,7 @@
             <a:pPr algn="just"/>
             <a:r>
               <a:rPr lang="de-DE" dirty="0" smtClean="0"/>
-              <a:t>Lösungen &amp; Ansätze</a:t>
+              <a:t>Hauptproblem</a:t>
             </a:r>
           </a:p>
           <a:p>
@@ -7136,7 +7132,7 @@
             </a:r>
             <a:r>
               <a:rPr lang="de-DE" dirty="0" smtClean="0"/>
-              <a:t> wird verteilt</a:t>
+              <a:t> wenn es richtig ist</a:t>
             </a:r>
           </a:p>
         </p:txBody>
@@ -7344,7 +7340,7 @@
             <a:pPr algn="just"/>
             <a:r>
               <a:rPr lang="de-DE" sz="2400" dirty="0" smtClean="0"/>
-              <a:t>Lösung</a:t>
+              <a:t>Problem</a:t>
             </a:r>
           </a:p>
           <a:p>
@@ -7355,12 +7351,8 @@
             </a:r>
             <a:r>
               <a:rPr lang="de-DE" sz="2000" dirty="0" smtClean="0"/>
-              <a:t> wird zwar gegeben, aber zu häufig</a:t>
-            </a:r>
-          </a:p>
-          <a:p>
-            <a:pPr lvl="1" algn="just"/>
-            <a:endParaRPr lang="de-DE" sz="2000" dirty="0"/>
+              <a:t> bei Zusammenstoß mit der Wand wird nicht registriert</a:t>
+            </a:r>
           </a:p>
           <a:p>
             <a:pPr lvl="1" algn="just"/>
@@ -7370,7 +7362,7 @@
             </a:r>
             <a:r>
               <a:rPr lang="de-DE" sz="2000" dirty="0" smtClean="0"/>
-              <a:t> Höhe wurde reduziert</a:t>
+              <a:t> zu hoch oder zu niedrig</a:t>
             </a:r>
             <a:endParaRPr lang="de-DE" sz="2000" dirty="0"/>
           </a:p>
@@ -7465,7 +7457,7 @@
     </p:spTree>
     <p:extLst>
       <p:ext uri="{BB962C8B-B14F-4D97-AF65-F5344CB8AC3E}">
-        <p14:creationId xmlns:p14="http://schemas.microsoft.com/office/powerpoint/2010/main" val="888652820"/>
+        <p14:creationId xmlns:p14="http://schemas.microsoft.com/office/powerpoint/2010/main" val="2721563962"/>
       </p:ext>
     </p:extLst>
   </p:cSld>
@@ -7522,8 +7514,16 @@
               <a:rPr lang="de-DE" dirty="0" smtClean="0"/>
             </a:br>
             <a:r>
+              <a:rPr lang="de-DE" sz="3200" dirty="0" err="1" smtClean="0"/>
+              <a:t>Damage</a:t>
+            </a:r>
+            <a:r>
               <a:rPr lang="de-DE" sz="3200" dirty="0" smtClean="0"/>
-              <a:t>Kamera</a:t>
+              <a:t> </a:t>
+            </a:r>
+            <a:r>
+              <a:rPr lang="de-DE" sz="3200" dirty="0" err="1" smtClean="0"/>
+              <a:t>Calculation</a:t>
             </a:r>
             <a:endParaRPr lang="de-DE" sz="3200" dirty="0"/>
           </a:p>
@@ -7554,14 +7554,18 @@
             <a:pPr algn="just"/>
             <a:r>
               <a:rPr lang="de-DE" dirty="0" smtClean="0"/>
-              <a:t>Problematik</a:t>
+              <a:t>Lösungen &amp; Ansätze</a:t>
             </a:r>
           </a:p>
           <a:p>
             <a:pPr lvl="1" algn="just"/>
             <a:r>
-              <a:rPr lang="de-DE" dirty="0" smtClean="0"/>
-              <a:t>3rd Person Kamera hinter dem Wagen</a:t>
+              <a:rPr lang="de-DE" dirty="0" err="1" smtClean="0"/>
+              <a:t>Damage</a:t>
+            </a:r>
+            <a:r>
+              <a:rPr lang="de-DE" dirty="0" smtClean="0"/>
+              <a:t> wird verteilt</a:t>
             </a:r>
           </a:p>
         </p:txBody>
@@ -7769,14 +7773,18 @@
             <a:pPr algn="just"/>
             <a:r>
               <a:rPr lang="de-DE" sz="2400" dirty="0" smtClean="0"/>
-              <a:t>Problem</a:t>
+              <a:t>Lösung</a:t>
             </a:r>
           </a:p>
           <a:p>
             <a:pPr lvl="1" algn="just"/>
             <a:r>
+              <a:rPr lang="de-DE" sz="2000" dirty="0" err="1" smtClean="0"/>
+              <a:t>Damage</a:t>
+            </a:r>
+            <a:r>
               <a:rPr lang="de-DE" sz="2000" dirty="0" smtClean="0"/>
-              <a:t>Kamera ist nicht richtig eingestellt</a:t>
+              <a:t> wird zwar gegeben, aber zu häufig</a:t>
             </a:r>
           </a:p>
           <a:p>
@@ -7786,8 +7794,12 @@
           <a:p>
             <a:pPr lvl="1" algn="just"/>
             <a:r>
+              <a:rPr lang="de-DE" sz="2000" dirty="0" err="1" smtClean="0"/>
+              <a:t>Damage</a:t>
+            </a:r>
+            <a:r>
               <a:rPr lang="de-DE" sz="2000" dirty="0" smtClean="0"/>
-              <a:t>Kamera folgt nicht dem Wagen</a:t>
+              <a:t> Höhe wurde reduziert</a:t>
             </a:r>
             <a:endParaRPr lang="de-DE" sz="2000" dirty="0"/>
           </a:p>
@@ -7864,8 +7876,16 @@
           <a:lstStyle/>
           <a:p>
             <a:r>
-              <a:rPr lang="de-DE" dirty="0" smtClean="0"/>
-              <a:t>Screenshot – 3rd Person Kamera View</a:t>
+              <a:rPr lang="de-DE" dirty="0" err="1" smtClean="0"/>
+              <a:t>Gif</a:t>
+            </a:r>
+            <a:r>
+              <a:rPr lang="de-DE" dirty="0" smtClean="0"/>
+              <a:t> – Spieler erhält </a:t>
+            </a:r>
+            <a:r>
+              <a:rPr lang="de-DE" dirty="0" err="1" smtClean="0"/>
+              <a:t>Damage</a:t>
             </a:r>
             <a:endParaRPr lang="de-DE" dirty="0"/>
           </a:p>
@@ -7874,7 +7894,7 @@
     </p:spTree>
     <p:extLst>
       <p:ext uri="{BB962C8B-B14F-4D97-AF65-F5344CB8AC3E}">
-        <p14:creationId xmlns:p14="http://schemas.microsoft.com/office/powerpoint/2010/main" val="3114547157"/>
+        <p14:creationId xmlns:p14="http://schemas.microsoft.com/office/powerpoint/2010/main" val="888652820"/>
       </p:ext>
     </p:extLst>
   </p:cSld>
@@ -7944,12 +7964,12 @@
         <p:spPr>
           <a:xfrm>
             <a:off x="609600" y="2708921"/>
-            <a:ext cx="3512024" cy="3417243"/>
+            <a:ext cx="2870579" cy="3417243"/>
           </a:xfrm>
         </p:spPr>
         <p:txBody>
           <a:bodyPr>
-            <a:normAutofit fontScale="55000" lnSpcReduction="20000"/>
+            <a:noAutofit/>
           </a:bodyPr>
           <a:lstStyle/>
           <a:p>
@@ -7959,8 +7979,12 @@
               </a:lnSpc>
             </a:pPr>
             <a:r>
-              <a:rPr lang="de-DE" dirty="0" smtClean="0"/>
-              <a:t>Das Spiel</a:t>
+              <a:rPr lang="de-DE" sz="1800" dirty="0" smtClean="0"/>
+              <a:t>Das </a:t>
+            </a:r>
+            <a:r>
+              <a:rPr lang="de-DE" sz="1800" dirty="0" smtClean="0"/>
+              <a:t>Spiel</a:t>
             </a:r>
           </a:p>
           <a:p>
@@ -7970,109 +7994,8 @@
               </a:lnSpc>
             </a:pPr>
             <a:r>
-              <a:rPr lang="de-DE" dirty="0" smtClean="0"/>
-              <a:t>Herausforderungen</a:t>
-            </a:r>
-          </a:p>
-          <a:p>
-            <a:pPr lvl="1">
-              <a:lnSpc>
-                <a:spcPct val="150000"/>
-              </a:lnSpc>
-            </a:pPr>
-            <a:r>
-              <a:rPr lang="de-DE" dirty="0" smtClean="0"/>
-              <a:t>Umwelt</a:t>
-            </a:r>
-          </a:p>
-          <a:p>
-            <a:pPr lvl="1">
-              <a:lnSpc>
-                <a:spcPct val="150000"/>
-              </a:lnSpc>
-            </a:pPr>
-            <a:r>
-              <a:rPr lang="de-DE" dirty="0" smtClean="0"/>
-              <a:t>Power </a:t>
-            </a:r>
-            <a:r>
-              <a:rPr lang="de-DE" dirty="0" err="1" smtClean="0"/>
-              <a:t>Ups</a:t>
-            </a:r>
-            <a:endParaRPr lang="de-DE" dirty="0" smtClean="0"/>
-          </a:p>
-          <a:p>
-            <a:pPr lvl="1">
-              <a:lnSpc>
-                <a:spcPct val="150000"/>
-              </a:lnSpc>
-            </a:pPr>
-            <a:r>
-              <a:rPr lang="de-DE" dirty="0" err="1"/>
-              <a:t>Collision</a:t>
-            </a:r>
-            <a:r>
-              <a:rPr lang="de-DE" dirty="0"/>
-              <a:t> </a:t>
-            </a:r>
-            <a:r>
-              <a:rPr lang="de-DE" dirty="0" err="1" smtClean="0"/>
-              <a:t>Detection</a:t>
-            </a:r>
-            <a:endParaRPr lang="de-DE" dirty="0" smtClean="0"/>
-          </a:p>
-          <a:p>
-            <a:pPr lvl="1">
-              <a:lnSpc>
-                <a:spcPct val="150000"/>
-              </a:lnSpc>
-            </a:pPr>
-            <a:r>
-              <a:rPr lang="de-DE" dirty="0" smtClean="0"/>
-              <a:t>Checkpoints</a:t>
-            </a:r>
-          </a:p>
-          <a:p>
-            <a:pPr lvl="1">
-              <a:lnSpc>
-                <a:spcPct val="150000"/>
-              </a:lnSpc>
-            </a:pPr>
-            <a:r>
-              <a:rPr lang="de-DE" dirty="0" err="1" smtClean="0"/>
-              <a:t>Respawn</a:t>
-            </a:r>
-            <a:endParaRPr lang="de-DE" dirty="0" smtClean="0"/>
-          </a:p>
-          <a:p>
-            <a:pPr lvl="1">
-              <a:lnSpc>
-                <a:spcPct val="150000"/>
-              </a:lnSpc>
-            </a:pPr>
-            <a:r>
-              <a:rPr lang="de-DE" dirty="0" err="1" smtClean="0"/>
-              <a:t>Damage</a:t>
-            </a:r>
-            <a:r>
-              <a:rPr lang="de-DE" dirty="0" smtClean="0"/>
-              <a:t> </a:t>
-            </a:r>
-            <a:r>
-              <a:rPr lang="de-DE" dirty="0" err="1" smtClean="0"/>
-              <a:t>Calculation</a:t>
-            </a:r>
-            <a:endParaRPr lang="de-DE" dirty="0" smtClean="0"/>
-          </a:p>
-          <a:p>
-            <a:pPr lvl="1">
-              <a:lnSpc>
-                <a:spcPct val="150000"/>
-              </a:lnSpc>
-            </a:pPr>
-            <a:r>
-              <a:rPr lang="de-DE" dirty="0" smtClean="0"/>
-              <a:t>Kamera</a:t>
+              <a:rPr lang="de-DE" sz="1800" dirty="0" smtClean="0"/>
+              <a:t>Code &amp; Erläuterung</a:t>
             </a:r>
           </a:p>
         </p:txBody>
@@ -8087,7 +8010,7 @@
         </p:nvSpPr>
         <p:spPr bwMode="auto">
           <a:xfrm>
-            <a:off x="4185212" y="2661636"/>
+            <a:off x="6926239" y="2661636"/>
             <a:ext cx="4236915" cy="3417243"/>
           </a:xfrm>
           <a:prstGeom prst="rect">
@@ -8318,6 +8241,320 @@
               <a:t>Anhang</a:t>
             </a:r>
             <a:endParaRPr lang="de-DE" sz="1800" dirty="0"/>
+          </a:p>
+        </p:txBody>
+      </p:sp>
+      <p:sp>
+        <p:nvSpPr>
+          <p:cNvPr id="5" name="Inhaltsplatzhalter 2"/>
+          <p:cNvSpPr txBox="1">
+            <a:spLocks/>
+          </p:cNvSpPr>
+          <p:nvPr/>
+        </p:nvSpPr>
+        <p:spPr bwMode="auto">
+          <a:xfrm>
+            <a:off x="3414215" y="2661636"/>
+            <a:ext cx="3512024" cy="3417243"/>
+          </a:xfrm>
+          <a:prstGeom prst="rect">
+            <a:avLst/>
+          </a:prstGeom>
+          <a:noFill/>
+          <a:ln>
+            <a:noFill/>
+          </a:ln>
+          <a:extLst>
+            <a:ext uri="{909E8E84-426E-40DD-AFC4-6F175D3DCCD1}">
+              <a14:hiddenFill xmlns:a14="http://schemas.microsoft.com/office/drawing/2010/main">
+                <a:solidFill>
+                  <a:srgbClr val="FFFFFF"/>
+                </a:solidFill>
+              </a14:hiddenFill>
+            </a:ext>
+            <a:ext uri="{91240B29-F687-4F45-9708-019B960494DF}">
+              <a14:hiddenLine xmlns:a14="http://schemas.microsoft.com/office/drawing/2010/main" w="9525">
+                <a:solidFill>
+                  <a:srgbClr val="000000"/>
+                </a:solidFill>
+                <a:miter lim="800000"/>
+                <a:headEnd/>
+                <a:tailEnd/>
+              </a14:hiddenLine>
+            </a:ext>
+          </a:extLst>
+        </p:spPr>
+        <p:txBody>
+          <a:bodyPr vert="horz" wrap="square" lIns="91440" tIns="45720" rIns="91440" bIns="45720" numCol="1" anchor="t" anchorCtr="0" compatLnSpc="1">
+            <a:prstTxWarp prst="textNoShape">
+              <a:avLst/>
+            </a:prstTxWarp>
+            <a:noAutofit/>
+          </a:bodyPr>
+          <a:lstStyle>
+            <a:lvl1pPr marL="342900" indent="-342900" algn="l" rtl="0" eaLnBrk="1" fontAlgn="base" hangingPunct="1">
+              <a:spcBef>
+                <a:spcPct val="20000"/>
+              </a:spcBef>
+              <a:spcAft>
+                <a:spcPct val="0"/>
+              </a:spcAft>
+              <a:buFont typeface="Arial" charset="0"/>
+              <a:buChar char="•"/>
+              <a:defRPr sz="3200" kern="1200">
+                <a:solidFill>
+                  <a:schemeClr val="tx1"/>
+                </a:solidFill>
+                <a:latin typeface="+mn-lt"/>
+                <a:ea typeface="+mn-ea"/>
+                <a:cs typeface="+mn-cs"/>
+              </a:defRPr>
+            </a:lvl1pPr>
+            <a:lvl2pPr marL="742950" indent="-285750" algn="l" rtl="0" eaLnBrk="1" fontAlgn="base" hangingPunct="1">
+              <a:spcBef>
+                <a:spcPct val="20000"/>
+              </a:spcBef>
+              <a:spcAft>
+                <a:spcPct val="0"/>
+              </a:spcAft>
+              <a:buFont typeface="Arial" charset="0"/>
+              <a:buChar char="–"/>
+              <a:defRPr sz="2800" kern="1200">
+                <a:solidFill>
+                  <a:schemeClr val="tx1"/>
+                </a:solidFill>
+                <a:latin typeface="+mn-lt"/>
+                <a:ea typeface="+mn-ea"/>
+                <a:cs typeface="+mn-cs"/>
+              </a:defRPr>
+            </a:lvl2pPr>
+            <a:lvl3pPr marL="1143000" indent="-228600" algn="l" rtl="0" eaLnBrk="1" fontAlgn="base" hangingPunct="1">
+              <a:spcBef>
+                <a:spcPct val="20000"/>
+              </a:spcBef>
+              <a:spcAft>
+                <a:spcPct val="0"/>
+              </a:spcAft>
+              <a:buFont typeface="Arial" charset="0"/>
+              <a:buChar char="•"/>
+              <a:defRPr sz="2400" kern="1200">
+                <a:solidFill>
+                  <a:schemeClr val="tx1"/>
+                </a:solidFill>
+                <a:latin typeface="+mn-lt"/>
+                <a:ea typeface="+mn-ea"/>
+                <a:cs typeface="+mn-cs"/>
+              </a:defRPr>
+            </a:lvl3pPr>
+            <a:lvl4pPr marL="1600200" indent="-228600" algn="l" rtl="0" eaLnBrk="1" fontAlgn="base" hangingPunct="1">
+              <a:spcBef>
+                <a:spcPct val="20000"/>
+              </a:spcBef>
+              <a:spcAft>
+                <a:spcPct val="0"/>
+              </a:spcAft>
+              <a:buFont typeface="Arial" charset="0"/>
+              <a:buChar char="–"/>
+              <a:defRPr sz="2000" kern="1200">
+                <a:solidFill>
+                  <a:schemeClr val="tx1"/>
+                </a:solidFill>
+                <a:latin typeface="+mn-lt"/>
+                <a:ea typeface="+mn-ea"/>
+                <a:cs typeface="+mn-cs"/>
+              </a:defRPr>
+            </a:lvl4pPr>
+            <a:lvl5pPr marL="2057400" indent="-228600" algn="l" rtl="0" eaLnBrk="1" fontAlgn="base" hangingPunct="1">
+              <a:spcBef>
+                <a:spcPct val="20000"/>
+              </a:spcBef>
+              <a:spcAft>
+                <a:spcPct val="0"/>
+              </a:spcAft>
+              <a:buFont typeface="Arial" charset="0"/>
+              <a:buChar char="»"/>
+              <a:defRPr sz="2000" kern="1200">
+                <a:solidFill>
+                  <a:schemeClr val="tx1"/>
+                </a:solidFill>
+                <a:latin typeface="+mn-lt"/>
+                <a:ea typeface="+mn-ea"/>
+                <a:cs typeface="+mn-cs"/>
+              </a:defRPr>
+            </a:lvl5pPr>
+            <a:lvl6pPr marL="2514600" indent="-228600" algn="l" defTabSz="914400" rtl="0" eaLnBrk="1" latinLnBrk="0" hangingPunct="1">
+              <a:spcBef>
+                <a:spcPct val="20000"/>
+              </a:spcBef>
+              <a:buFont typeface="Arial" pitchFamily="34" charset="0"/>
+              <a:buChar char="•"/>
+              <a:defRPr sz="2000" kern="1200">
+                <a:solidFill>
+                  <a:schemeClr val="tx1"/>
+                </a:solidFill>
+                <a:latin typeface="+mn-lt"/>
+                <a:ea typeface="+mn-ea"/>
+                <a:cs typeface="+mn-cs"/>
+              </a:defRPr>
+            </a:lvl6pPr>
+            <a:lvl7pPr marL="2971800" indent="-228600" algn="l" defTabSz="914400" rtl="0" eaLnBrk="1" latinLnBrk="0" hangingPunct="1">
+              <a:spcBef>
+                <a:spcPct val="20000"/>
+              </a:spcBef>
+              <a:buFont typeface="Arial" pitchFamily="34" charset="0"/>
+              <a:buChar char="•"/>
+              <a:defRPr sz="2000" kern="1200">
+                <a:solidFill>
+                  <a:schemeClr val="tx1"/>
+                </a:solidFill>
+                <a:latin typeface="+mn-lt"/>
+                <a:ea typeface="+mn-ea"/>
+                <a:cs typeface="+mn-cs"/>
+              </a:defRPr>
+            </a:lvl7pPr>
+            <a:lvl8pPr marL="3429000" indent="-228600" algn="l" defTabSz="914400" rtl="0" eaLnBrk="1" latinLnBrk="0" hangingPunct="1">
+              <a:spcBef>
+                <a:spcPct val="20000"/>
+              </a:spcBef>
+              <a:buFont typeface="Arial" pitchFamily="34" charset="0"/>
+              <a:buChar char="•"/>
+              <a:defRPr sz="2000" kern="1200">
+                <a:solidFill>
+                  <a:schemeClr val="tx1"/>
+                </a:solidFill>
+                <a:latin typeface="+mn-lt"/>
+                <a:ea typeface="+mn-ea"/>
+                <a:cs typeface="+mn-cs"/>
+              </a:defRPr>
+            </a:lvl8pPr>
+            <a:lvl9pPr marL="3886200" indent="-228600" algn="l" defTabSz="914400" rtl="0" eaLnBrk="1" latinLnBrk="0" hangingPunct="1">
+              <a:spcBef>
+                <a:spcPct val="20000"/>
+              </a:spcBef>
+              <a:buFont typeface="Arial" pitchFamily="34" charset="0"/>
+              <a:buChar char="•"/>
+              <a:defRPr sz="2000" kern="1200">
+                <a:solidFill>
+                  <a:schemeClr val="tx1"/>
+                </a:solidFill>
+                <a:latin typeface="+mn-lt"/>
+                <a:ea typeface="+mn-ea"/>
+                <a:cs typeface="+mn-cs"/>
+              </a:defRPr>
+            </a:lvl9pPr>
+          </a:lstStyle>
+          <a:p>
+            <a:pPr>
+              <a:lnSpc>
+                <a:spcPct val="150000"/>
+              </a:lnSpc>
+            </a:pPr>
+            <a:r>
+              <a:rPr lang="de-DE" sz="2000" dirty="0" smtClean="0"/>
+              <a:t>Herausforderungen</a:t>
+            </a:r>
+          </a:p>
+          <a:p>
+            <a:pPr lvl="1">
+              <a:lnSpc>
+                <a:spcPct val="150000"/>
+              </a:lnSpc>
+            </a:pPr>
+            <a:r>
+              <a:rPr lang="de-DE" sz="1800" dirty="0" smtClean="0"/>
+              <a:t>Umwelt</a:t>
+            </a:r>
+          </a:p>
+          <a:p>
+            <a:pPr lvl="1">
+              <a:lnSpc>
+                <a:spcPct val="150000"/>
+              </a:lnSpc>
+            </a:pPr>
+            <a:r>
+              <a:rPr lang="de-DE" sz="1800" dirty="0" smtClean="0"/>
+              <a:t>Power </a:t>
+            </a:r>
+            <a:r>
+              <a:rPr lang="de-DE" sz="1800" dirty="0" err="1" smtClean="0"/>
+              <a:t>Ups</a:t>
+            </a:r>
+            <a:endParaRPr lang="de-DE" sz="1800" dirty="0" smtClean="0"/>
+          </a:p>
+          <a:p>
+            <a:pPr lvl="1">
+              <a:lnSpc>
+                <a:spcPct val="150000"/>
+              </a:lnSpc>
+            </a:pPr>
+            <a:r>
+              <a:rPr lang="de-DE" sz="1800" dirty="0" err="1" smtClean="0"/>
+              <a:t>Collision</a:t>
+            </a:r>
+            <a:r>
+              <a:rPr lang="de-DE" sz="1800" dirty="0" smtClean="0"/>
+              <a:t> </a:t>
+            </a:r>
+            <a:r>
+              <a:rPr lang="de-DE" sz="1800" dirty="0" err="1" smtClean="0"/>
+              <a:t>Detection</a:t>
+            </a:r>
+            <a:endParaRPr lang="de-DE" sz="1800" dirty="0" smtClean="0"/>
+          </a:p>
+          <a:p>
+            <a:pPr lvl="1">
+              <a:lnSpc>
+                <a:spcPct val="150000"/>
+              </a:lnSpc>
+            </a:pPr>
+            <a:r>
+              <a:rPr lang="de-DE" sz="1800" dirty="0" smtClean="0"/>
+              <a:t>Checkpoints</a:t>
+            </a:r>
+          </a:p>
+          <a:p>
+            <a:pPr lvl="1">
+              <a:lnSpc>
+                <a:spcPct val="150000"/>
+              </a:lnSpc>
+            </a:pPr>
+            <a:r>
+              <a:rPr lang="de-DE" sz="1800" dirty="0" err="1" smtClean="0"/>
+              <a:t>Respawn</a:t>
+            </a:r>
+            <a:endParaRPr lang="de-DE" sz="1800" dirty="0" smtClean="0"/>
+          </a:p>
+          <a:p>
+            <a:pPr lvl="1">
+              <a:lnSpc>
+                <a:spcPct val="150000"/>
+              </a:lnSpc>
+            </a:pPr>
+            <a:r>
+              <a:rPr lang="de-DE" sz="1800" dirty="0" err="1" smtClean="0"/>
+              <a:t>Damage</a:t>
+            </a:r>
+            <a:r>
+              <a:rPr lang="de-DE" sz="1800" dirty="0" smtClean="0"/>
+              <a:t> </a:t>
+            </a:r>
+            <a:r>
+              <a:rPr lang="de-DE" sz="1800" dirty="0" err="1" smtClean="0"/>
+              <a:t>Calculation</a:t>
+            </a:r>
+            <a:endParaRPr lang="de-DE" sz="1800" dirty="0" smtClean="0"/>
+          </a:p>
+          <a:p>
+            <a:pPr lvl="1">
+              <a:lnSpc>
+                <a:spcPct val="150000"/>
+              </a:lnSpc>
+            </a:pPr>
+            <a:r>
+              <a:rPr lang="de-DE" sz="1800" dirty="0" smtClean="0"/>
+              <a:t>Kamera</a:t>
+            </a:r>
+            <a:endParaRPr lang="de-DE" sz="1800" dirty="0" smtClean="0"/>
           </a:p>
         </p:txBody>
       </p:sp>
@@ -8413,14 +8650,14 @@
             <a:pPr algn="just"/>
             <a:r>
               <a:rPr lang="de-DE" dirty="0" smtClean="0"/>
-              <a:t>Die Lösung</a:t>
+              <a:t>Problematik</a:t>
             </a:r>
           </a:p>
           <a:p>
             <a:pPr lvl="1" algn="just"/>
             <a:r>
               <a:rPr lang="de-DE" dirty="0" smtClean="0"/>
-              <a:t>Relativ einfache Problematik</a:t>
+              <a:t>3rd Person Kamera hinter dem Wagen</a:t>
             </a:r>
           </a:p>
         </p:txBody>
@@ -8436,7 +8673,7 @@
         <p:spPr bwMode="auto">
           <a:xfrm>
             <a:off x="7806519" y="2711197"/>
-            <a:ext cx="4012441" cy="1164197"/>
+            <a:ext cx="4012441" cy="2328394"/>
           </a:xfrm>
           <a:prstGeom prst="rect">
             <a:avLst/>
@@ -8628,14 +8865,25 @@
             <a:pPr algn="just"/>
             <a:r>
               <a:rPr lang="de-DE" sz="2400" dirty="0" smtClean="0"/>
-              <a:t>Lösung</a:t>
+              <a:t>Problem</a:t>
             </a:r>
           </a:p>
           <a:p>
             <a:pPr lvl="1" algn="just"/>
             <a:r>
               <a:rPr lang="de-DE" sz="2000" dirty="0" smtClean="0"/>
-              <a:t>Eine Codezeile genügte um es zu richten.</a:t>
+              <a:t>Kamera ist nicht richtig eingestellt</a:t>
+            </a:r>
+          </a:p>
+          <a:p>
+            <a:pPr lvl="1" algn="just"/>
+            <a:endParaRPr lang="de-DE" sz="2000" dirty="0"/>
+          </a:p>
+          <a:p>
+            <a:pPr lvl="1" algn="just"/>
+            <a:r>
+              <a:rPr lang="de-DE" sz="2000" dirty="0" smtClean="0"/>
+              <a:t>Kamera folgt nicht dem Wagen</a:t>
             </a:r>
             <a:endParaRPr lang="de-DE" sz="2000" dirty="0"/>
           </a:p>
@@ -8698,6 +8946,404 @@
         <p:spPr>
           <a:xfrm>
             <a:off x="1460314" y="6387149"/>
+            <a:ext cx="5131555" cy="369332"/>
+          </a:xfrm>
+          <a:prstGeom prst="rect">
+            <a:avLst/>
+          </a:prstGeom>
+          <a:noFill/>
+        </p:spPr>
+        <p:txBody>
+          <a:bodyPr wrap="square" rtlCol="0">
+            <a:spAutoFit/>
+          </a:bodyPr>
+          <a:lstStyle/>
+          <a:p>
+            <a:r>
+              <a:rPr lang="de-DE" dirty="0" smtClean="0"/>
+              <a:t>Screenshot – 3rd Person Kamera View</a:t>
+            </a:r>
+            <a:endParaRPr lang="de-DE" dirty="0"/>
+          </a:p>
+        </p:txBody>
+      </p:sp>
+    </p:spTree>
+    <p:extLst>
+      <p:ext uri="{BB962C8B-B14F-4D97-AF65-F5344CB8AC3E}">
+        <p14:creationId xmlns:p14="http://schemas.microsoft.com/office/powerpoint/2010/main" val="3114547157"/>
+      </p:ext>
+    </p:extLst>
+  </p:cSld>
+  <p:clrMapOvr>
+    <a:masterClrMapping/>
+  </p:clrMapOvr>
+  <p:timing>
+    <p:tnLst>
+      <p:par>
+        <p:cTn id="1" dur="indefinite" restart="never" nodeType="tmRoot"/>
+      </p:par>
+    </p:tnLst>
+  </p:timing>
+</p:sld>
+</file>
+
+<file path=ppt/slides/slide21.xml><?xml version="1.0" encoding="utf-8"?>
+<p:sld xmlns:a="http://schemas.openxmlformats.org/drawingml/2006/main" xmlns:r="http://schemas.openxmlformats.org/officeDocument/2006/relationships" xmlns:p="http://schemas.openxmlformats.org/presentationml/2006/main">
+  <p:cSld>
+    <p:spTree>
+      <p:nvGrpSpPr>
+        <p:cNvPr id="1" name=""/>
+        <p:cNvGrpSpPr/>
+        <p:nvPr/>
+      </p:nvGrpSpPr>
+      <p:grpSpPr>
+        <a:xfrm>
+          <a:off x="0" y="0"/>
+          <a:ext cx="0" cy="0"/>
+          <a:chOff x="0" y="0"/>
+          <a:chExt cx="0" cy="0"/>
+        </a:xfrm>
+      </p:grpSpPr>
+      <p:sp>
+        <p:nvSpPr>
+          <p:cNvPr id="2" name="Titel 1"/>
+          <p:cNvSpPr>
+            <a:spLocks noGrp="1"/>
+          </p:cNvSpPr>
+          <p:nvPr>
+            <p:ph type="title"/>
+          </p:nvPr>
+        </p:nvSpPr>
+        <p:spPr/>
+        <p:txBody>
+          <a:bodyPr/>
+          <a:lstStyle/>
+          <a:p>
+            <a:r>
+              <a:rPr lang="de-DE" dirty="0" smtClean="0"/>
+              <a:t>Herausforderungen</a:t>
+            </a:r>
+            <a:br>
+              <a:rPr lang="de-DE" dirty="0" smtClean="0"/>
+            </a:br>
+            <a:r>
+              <a:rPr lang="de-DE" sz="3200" dirty="0" smtClean="0"/>
+              <a:t>Kamera</a:t>
+            </a:r>
+            <a:endParaRPr lang="de-DE" sz="3200" dirty="0"/>
+          </a:p>
+        </p:txBody>
+      </p:sp>
+      <p:sp>
+        <p:nvSpPr>
+          <p:cNvPr id="3" name="Inhaltsplatzhalter 2"/>
+          <p:cNvSpPr>
+            <a:spLocks noGrp="1"/>
+          </p:cNvSpPr>
+          <p:nvPr>
+            <p:ph idx="1"/>
+          </p:nvPr>
+        </p:nvSpPr>
+        <p:spPr>
+          <a:xfrm>
+            <a:off x="978090" y="2586094"/>
+            <a:ext cx="6787486" cy="1289872"/>
+          </a:xfrm>
+        </p:spPr>
+        <p:txBody>
+          <a:bodyPr>
+            <a:normAutofit/>
+          </a:bodyPr>
+          <a:lstStyle/>
+          <a:p>
+            <a:pPr algn="just"/>
+            <a:r>
+              <a:rPr lang="de-DE" dirty="0" smtClean="0"/>
+              <a:t>Die Lösung</a:t>
+            </a:r>
+          </a:p>
+          <a:p>
+            <a:pPr lvl="1" algn="just"/>
+            <a:r>
+              <a:rPr lang="de-DE" dirty="0" smtClean="0"/>
+              <a:t>Relativ einfache Problematik</a:t>
+            </a:r>
+          </a:p>
+        </p:txBody>
+      </p:sp>
+      <p:sp>
+        <p:nvSpPr>
+          <p:cNvPr id="4" name="Inhaltsplatzhalter 2"/>
+          <p:cNvSpPr txBox="1">
+            <a:spLocks/>
+          </p:cNvSpPr>
+          <p:nvPr/>
+        </p:nvSpPr>
+        <p:spPr bwMode="auto">
+          <a:xfrm>
+            <a:off x="7806519" y="2711197"/>
+            <a:ext cx="4012441" cy="1164197"/>
+          </a:xfrm>
+          <a:prstGeom prst="rect">
+            <a:avLst/>
+          </a:prstGeom>
+          <a:noFill/>
+          <a:ln>
+            <a:noFill/>
+          </a:ln>
+          <a:extLst>
+            <a:ext uri="{909E8E84-426E-40DD-AFC4-6F175D3DCCD1}">
+              <a14:hiddenFill xmlns:a14="http://schemas.microsoft.com/office/drawing/2010/main">
+                <a:solidFill>
+                  <a:srgbClr val="FFFFFF"/>
+                </a:solidFill>
+              </a14:hiddenFill>
+            </a:ext>
+            <a:ext uri="{91240B29-F687-4F45-9708-019B960494DF}">
+              <a14:hiddenLine xmlns:a14="http://schemas.microsoft.com/office/drawing/2010/main" w="9525">
+                <a:solidFill>
+                  <a:srgbClr val="000000"/>
+                </a:solidFill>
+                <a:miter lim="800000"/>
+                <a:headEnd/>
+                <a:tailEnd/>
+              </a14:hiddenLine>
+            </a:ext>
+          </a:extLst>
+        </p:spPr>
+        <p:txBody>
+          <a:bodyPr vert="horz" wrap="square" lIns="91440" tIns="45720" rIns="91440" bIns="45720" numCol="1" anchor="t" anchorCtr="0" compatLnSpc="1">
+            <a:prstTxWarp prst="textNoShape">
+              <a:avLst/>
+            </a:prstTxWarp>
+            <a:noAutofit/>
+          </a:bodyPr>
+          <a:lstStyle>
+            <a:lvl1pPr marL="342900" indent="-342900" algn="l" rtl="0" eaLnBrk="1" fontAlgn="base" hangingPunct="1">
+              <a:spcBef>
+                <a:spcPct val="20000"/>
+              </a:spcBef>
+              <a:spcAft>
+                <a:spcPct val="0"/>
+              </a:spcAft>
+              <a:buFont typeface="Arial" charset="0"/>
+              <a:buChar char="•"/>
+              <a:defRPr sz="3200" kern="1200">
+                <a:solidFill>
+                  <a:schemeClr val="tx1"/>
+                </a:solidFill>
+                <a:latin typeface="+mn-lt"/>
+                <a:ea typeface="+mn-ea"/>
+                <a:cs typeface="+mn-cs"/>
+              </a:defRPr>
+            </a:lvl1pPr>
+            <a:lvl2pPr marL="742950" indent="-285750" algn="l" rtl="0" eaLnBrk="1" fontAlgn="base" hangingPunct="1">
+              <a:spcBef>
+                <a:spcPct val="20000"/>
+              </a:spcBef>
+              <a:spcAft>
+                <a:spcPct val="0"/>
+              </a:spcAft>
+              <a:buFont typeface="Arial" charset="0"/>
+              <a:buChar char="–"/>
+              <a:defRPr sz="2800" kern="1200">
+                <a:solidFill>
+                  <a:schemeClr val="tx1"/>
+                </a:solidFill>
+                <a:latin typeface="+mn-lt"/>
+                <a:ea typeface="+mn-ea"/>
+                <a:cs typeface="+mn-cs"/>
+              </a:defRPr>
+            </a:lvl2pPr>
+            <a:lvl3pPr marL="1143000" indent="-228600" algn="l" rtl="0" eaLnBrk="1" fontAlgn="base" hangingPunct="1">
+              <a:spcBef>
+                <a:spcPct val="20000"/>
+              </a:spcBef>
+              <a:spcAft>
+                <a:spcPct val="0"/>
+              </a:spcAft>
+              <a:buFont typeface="Arial" charset="0"/>
+              <a:buChar char="•"/>
+              <a:defRPr sz="2400" kern="1200">
+                <a:solidFill>
+                  <a:schemeClr val="tx1"/>
+                </a:solidFill>
+                <a:latin typeface="+mn-lt"/>
+                <a:ea typeface="+mn-ea"/>
+                <a:cs typeface="+mn-cs"/>
+              </a:defRPr>
+            </a:lvl3pPr>
+            <a:lvl4pPr marL="1600200" indent="-228600" algn="l" rtl="0" eaLnBrk="1" fontAlgn="base" hangingPunct="1">
+              <a:spcBef>
+                <a:spcPct val="20000"/>
+              </a:spcBef>
+              <a:spcAft>
+                <a:spcPct val="0"/>
+              </a:spcAft>
+              <a:buFont typeface="Arial" charset="0"/>
+              <a:buChar char="–"/>
+              <a:defRPr sz="2000" kern="1200">
+                <a:solidFill>
+                  <a:schemeClr val="tx1"/>
+                </a:solidFill>
+                <a:latin typeface="+mn-lt"/>
+                <a:ea typeface="+mn-ea"/>
+                <a:cs typeface="+mn-cs"/>
+              </a:defRPr>
+            </a:lvl4pPr>
+            <a:lvl5pPr marL="2057400" indent="-228600" algn="l" rtl="0" eaLnBrk="1" fontAlgn="base" hangingPunct="1">
+              <a:spcBef>
+                <a:spcPct val="20000"/>
+              </a:spcBef>
+              <a:spcAft>
+                <a:spcPct val="0"/>
+              </a:spcAft>
+              <a:buFont typeface="Arial" charset="0"/>
+              <a:buChar char="»"/>
+              <a:defRPr sz="2000" kern="1200">
+                <a:solidFill>
+                  <a:schemeClr val="tx1"/>
+                </a:solidFill>
+                <a:latin typeface="+mn-lt"/>
+                <a:ea typeface="+mn-ea"/>
+                <a:cs typeface="+mn-cs"/>
+              </a:defRPr>
+            </a:lvl5pPr>
+            <a:lvl6pPr marL="2514600" indent="-228600" algn="l" defTabSz="914400" rtl="0" eaLnBrk="1" latinLnBrk="0" hangingPunct="1">
+              <a:spcBef>
+                <a:spcPct val="20000"/>
+              </a:spcBef>
+              <a:buFont typeface="Arial" pitchFamily="34" charset="0"/>
+              <a:buChar char="•"/>
+              <a:defRPr sz="2000" kern="1200">
+                <a:solidFill>
+                  <a:schemeClr val="tx1"/>
+                </a:solidFill>
+                <a:latin typeface="+mn-lt"/>
+                <a:ea typeface="+mn-ea"/>
+                <a:cs typeface="+mn-cs"/>
+              </a:defRPr>
+            </a:lvl6pPr>
+            <a:lvl7pPr marL="2971800" indent="-228600" algn="l" defTabSz="914400" rtl="0" eaLnBrk="1" latinLnBrk="0" hangingPunct="1">
+              <a:spcBef>
+                <a:spcPct val="20000"/>
+              </a:spcBef>
+              <a:buFont typeface="Arial" pitchFamily="34" charset="0"/>
+              <a:buChar char="•"/>
+              <a:defRPr sz="2000" kern="1200">
+                <a:solidFill>
+                  <a:schemeClr val="tx1"/>
+                </a:solidFill>
+                <a:latin typeface="+mn-lt"/>
+                <a:ea typeface="+mn-ea"/>
+                <a:cs typeface="+mn-cs"/>
+              </a:defRPr>
+            </a:lvl7pPr>
+            <a:lvl8pPr marL="3429000" indent="-228600" algn="l" defTabSz="914400" rtl="0" eaLnBrk="1" latinLnBrk="0" hangingPunct="1">
+              <a:spcBef>
+                <a:spcPct val="20000"/>
+              </a:spcBef>
+              <a:buFont typeface="Arial" pitchFamily="34" charset="0"/>
+              <a:buChar char="•"/>
+              <a:defRPr sz="2000" kern="1200">
+                <a:solidFill>
+                  <a:schemeClr val="tx1"/>
+                </a:solidFill>
+                <a:latin typeface="+mn-lt"/>
+                <a:ea typeface="+mn-ea"/>
+                <a:cs typeface="+mn-cs"/>
+              </a:defRPr>
+            </a:lvl8pPr>
+            <a:lvl9pPr marL="3886200" indent="-228600" algn="l" defTabSz="914400" rtl="0" eaLnBrk="1" latinLnBrk="0" hangingPunct="1">
+              <a:spcBef>
+                <a:spcPct val="20000"/>
+              </a:spcBef>
+              <a:buFont typeface="Arial" pitchFamily="34" charset="0"/>
+              <a:buChar char="•"/>
+              <a:defRPr sz="2000" kern="1200">
+                <a:solidFill>
+                  <a:schemeClr val="tx1"/>
+                </a:solidFill>
+                <a:latin typeface="+mn-lt"/>
+                <a:ea typeface="+mn-ea"/>
+                <a:cs typeface="+mn-cs"/>
+              </a:defRPr>
+            </a:lvl9pPr>
+          </a:lstStyle>
+          <a:p>
+            <a:pPr algn="just"/>
+            <a:r>
+              <a:rPr lang="de-DE" sz="2400" dirty="0" smtClean="0"/>
+              <a:t>Lösung</a:t>
+            </a:r>
+          </a:p>
+          <a:p>
+            <a:pPr lvl="1" algn="just"/>
+            <a:r>
+              <a:rPr lang="de-DE" sz="2000" dirty="0" smtClean="0"/>
+              <a:t>Eine Codezeile genügte um es zu richten.</a:t>
+            </a:r>
+            <a:endParaRPr lang="de-DE" sz="2000" dirty="0"/>
+          </a:p>
+          <a:p>
+            <a:pPr lvl="1" algn="just"/>
+            <a:endParaRPr lang="de-DE" sz="1400" dirty="0"/>
+          </a:p>
+          <a:p>
+            <a:pPr lvl="1" algn="just"/>
+            <a:endParaRPr lang="de-DE" sz="1400" dirty="0" smtClean="0"/>
+          </a:p>
+        </p:txBody>
+      </p:sp>
+      <p:pic>
+        <p:nvPicPr>
+          <p:cNvPr id="2050" name="Picture 2"/>
+          <p:cNvPicPr>
+            <a:picLocks noChangeAspect="1" noChangeArrowheads="1"/>
+          </p:cNvPicPr>
+          <p:nvPr/>
+        </p:nvPicPr>
+        <p:blipFill>
+          <a:blip r:embed="rId2" cstate="print">
+            <a:extLst>
+              <a:ext uri="{28A0092B-C50C-407E-A947-70E740481C1C}">
+                <a14:useLocalDpi xmlns:a14="http://schemas.microsoft.com/office/drawing/2010/main" val="0"/>
+              </a:ext>
+            </a:extLst>
+          </a:blip>
+          <a:stretch>
+            <a:fillRect/>
+          </a:stretch>
+        </p:blipFill>
+        <p:spPr bwMode="auto">
+          <a:xfrm>
+            <a:off x="1435251" y="3802865"/>
+            <a:ext cx="4965549" cy="2473452"/>
+          </a:xfrm>
+          <a:prstGeom prst="rect">
+            <a:avLst/>
+          </a:prstGeom>
+          <a:noFill/>
+          <a:extLst>
+            <a:ext uri="{909E8E84-426E-40DD-AFC4-6F175D3DCCD1}">
+              <a14:hiddenFill xmlns:a14="http://schemas.microsoft.com/office/drawing/2010/main">
+                <a:solidFill>
+                  <a:srgbClr val="FFFFFF"/>
+                </a:solidFill>
+              </a14:hiddenFill>
+            </a:ext>
+          </a:extLst>
+        </p:spPr>
+      </p:pic>
+      <p:sp>
+        <p:nvSpPr>
+          <p:cNvPr id="6" name="Textfeld 5"/>
+          <p:cNvSpPr txBox="1"/>
+          <p:nvPr/>
+        </p:nvSpPr>
+        <p:spPr>
+          <a:xfrm>
+            <a:off x="1460314" y="6387149"/>
             <a:ext cx="3671244" cy="369332"/>
           </a:xfrm>
           <a:prstGeom prst="rect">
@@ -8813,7 +9459,7 @@
 </p:sld>
 </file>
 
-<file path=ppt/slides/slide21.xml><?xml version="1.0" encoding="utf-8"?>
+<file path=ppt/slides/slide22.xml><?xml version="1.0" encoding="utf-8"?>
 <p:sld xmlns:a="http://schemas.openxmlformats.org/drawingml/2006/main" xmlns:r="http://schemas.openxmlformats.org/officeDocument/2006/relationships" xmlns:p="http://schemas.openxmlformats.org/presentationml/2006/main">
   <p:cSld>
     <p:spTree>
@@ -8942,7 +9588,7 @@
 </p:sld>
 </file>
 
-<file path=ppt/slides/slide22.xml><?xml version="1.0" encoding="utf-8"?>
+<file path=ppt/slides/slide23.xml><?xml version="1.0" encoding="utf-8"?>
 <p:sld xmlns:a="http://schemas.openxmlformats.org/drawingml/2006/main" xmlns:r="http://schemas.openxmlformats.org/officeDocument/2006/relationships" xmlns:p="http://schemas.openxmlformats.org/presentationml/2006/main">
   <p:cSld>
     <p:spTree>
@@ -9424,138 +10070,6 @@
 </p:sld>
 </file>
 
-<file path=ppt/slides/slide23.xml><?xml version="1.0" encoding="utf-8"?>
-<p:sld xmlns:a="http://schemas.openxmlformats.org/drawingml/2006/main" xmlns:r="http://schemas.openxmlformats.org/officeDocument/2006/relationships" xmlns:p="http://schemas.openxmlformats.org/presentationml/2006/main">
-  <p:cSld>
-    <p:spTree>
-      <p:nvGrpSpPr>
-        <p:cNvPr id="1" name=""/>
-        <p:cNvGrpSpPr/>
-        <p:nvPr/>
-      </p:nvGrpSpPr>
-      <p:grpSpPr>
-        <a:xfrm>
-          <a:off x="0" y="0"/>
-          <a:ext cx="0" cy="0"/>
-          <a:chOff x="0" y="0"/>
-          <a:chExt cx="0" cy="0"/>
-        </a:xfrm>
-      </p:grpSpPr>
-      <p:sp>
-        <p:nvSpPr>
-          <p:cNvPr id="2" name="Titel 1"/>
-          <p:cNvSpPr>
-            <a:spLocks noGrp="1"/>
-          </p:cNvSpPr>
-          <p:nvPr>
-            <p:ph type="ctrTitle"/>
-          </p:nvPr>
-        </p:nvSpPr>
-        <p:spPr/>
-        <p:txBody>
-          <a:bodyPr/>
-          <a:lstStyle/>
-          <a:p>
-            <a:r>
-              <a:rPr lang="de-DE" dirty="0" smtClean="0"/>
-              <a:t>Anhang : Die Planungspräsentation</a:t>
-            </a:r>
-            <a:br>
-              <a:rPr lang="de-DE" dirty="0" smtClean="0"/>
-            </a:br>
-            <a:r>
-              <a:rPr lang="de-DE" dirty="0" smtClean="0"/>
-              <a:t>GDV- </a:t>
-            </a:r>
-            <a:r>
-              <a:rPr lang="de-DE" dirty="0" smtClean="0"/>
-              <a:t>Das Rennen – Till </a:t>
-            </a:r>
-            <a:r>
-              <a:rPr lang="de-DE" dirty="0" err="1" smtClean="0"/>
-              <a:t>the</a:t>
-            </a:r>
-            <a:r>
-              <a:rPr lang="de-DE" dirty="0" smtClean="0"/>
-              <a:t> </a:t>
-            </a:r>
-            <a:r>
-              <a:rPr lang="de-DE" dirty="0" err="1" smtClean="0"/>
-              <a:t>DeaS</a:t>
-            </a:r>
-            <a:endParaRPr lang="de-DE" dirty="0"/>
-          </a:p>
-        </p:txBody>
-      </p:sp>
-      <p:sp>
-        <p:nvSpPr>
-          <p:cNvPr id="3" name="Untertitel 2"/>
-          <p:cNvSpPr>
-            <a:spLocks noGrp="1"/>
-          </p:cNvSpPr>
-          <p:nvPr>
-            <p:ph type="subTitle" idx="1"/>
-          </p:nvPr>
-        </p:nvSpPr>
-        <p:spPr/>
-        <p:txBody>
-          <a:bodyPr/>
-          <a:lstStyle/>
-          <a:p>
-            <a:r>
-              <a:rPr lang="de-DE" sz="2400" dirty="0" smtClean="0">
-                <a:solidFill>
-                  <a:schemeClr val="bg1"/>
-                </a:solidFill>
-              </a:rPr>
-              <a:t>Gruppe: 4</a:t>
-            </a:r>
-          </a:p>
-          <a:p>
-            <a:r>
-              <a:rPr lang="de-DE" sz="2400" dirty="0" smtClean="0">
-                <a:solidFill>
-                  <a:schemeClr val="bg1"/>
-                </a:solidFill>
-              </a:rPr>
-              <a:t>Ludwig Loth, Markus Wiegand, Nils Jahnel, Sven </a:t>
-            </a:r>
-            <a:r>
-              <a:rPr lang="de-DE" sz="2400" dirty="0" err="1" smtClean="0">
-                <a:solidFill>
-                  <a:schemeClr val="bg1"/>
-                </a:solidFill>
-              </a:rPr>
-              <a:t>Wernikowski</a:t>
-            </a:r>
-            <a:endParaRPr lang="de-DE" sz="2400" dirty="0">
-              <a:solidFill>
-                <a:schemeClr val="bg1"/>
-              </a:solidFill>
-            </a:endParaRPr>
-          </a:p>
-        </p:txBody>
-      </p:sp>
-    </p:spTree>
-    <p:extLst>
-      <p:ext uri="{BB962C8B-B14F-4D97-AF65-F5344CB8AC3E}">
-        <p14:creationId xmlns:p14="http://schemas.microsoft.com/office/powerpoint/2010/main" val="3646409148"/>
-      </p:ext>
-    </p:extLst>
-  </p:cSld>
-  <p:clrMapOvr>
-    <a:masterClrMapping/>
-  </p:clrMapOvr>
-  <p:timing>
-    <p:tnLst>
-      <p:par>
-        <p:cTn id="1" dur="indefinite" restart="never" nodeType="tmRoot"/>
-      </p:par>
-    </p:tnLst>
-  </p:timing>
-</p:sld>
-</file>
-
 <file path=ppt/slides/slide24.xml><?xml version="1.0" encoding="utf-8"?>
 <p:sld xmlns:a="http://schemas.openxmlformats.org/drawingml/2006/main" xmlns:r="http://schemas.openxmlformats.org/officeDocument/2006/relationships" xmlns:p="http://schemas.openxmlformats.org/presentationml/2006/main">
   <p:cSld>
@@ -9580,7 +10094,7 @@
             <a:spLocks noGrp="1"/>
           </p:cNvSpPr>
           <p:nvPr>
-            <p:ph type="title"/>
+            <p:ph type="ctrTitle"/>
           </p:nvPr>
         </p:nvSpPr>
         <p:spPr/>
@@ -9590,7 +10104,26 @@
           <a:p>
             <a:r>
               <a:rPr lang="de-DE" dirty="0" smtClean="0"/>
-              <a:t>Gliederung	</a:t>
+              <a:t>Anhang : Die Planungspräsentation</a:t>
+            </a:r>
+            <a:br>
+              <a:rPr lang="de-DE" dirty="0" smtClean="0"/>
+            </a:br>
+            <a:r>
+              <a:rPr lang="de-DE" dirty="0" smtClean="0"/>
+              <a:t>GDV- Das Rennen – Till </a:t>
+            </a:r>
+            <a:r>
+              <a:rPr lang="de-DE" dirty="0" err="1" smtClean="0"/>
+              <a:t>the</a:t>
+            </a:r>
+            <a:r>
+              <a:rPr lang="de-DE" dirty="0" smtClean="0"/>
+              <a:t> </a:t>
+            </a:r>
+            <a:r>
+              <a:rPr lang="de-DE" dirty="0" err="1" smtClean="0"/>
+              <a:t>DeaS</a:t>
             </a:r>
             <a:endParaRPr lang="de-DE" dirty="0"/>
           </a:p>
@@ -9598,93 +10131,57 @@
       </p:sp>
       <p:sp>
         <p:nvSpPr>
-          <p:cNvPr id="3" name="Inhaltsplatzhalter 2"/>
+          <p:cNvPr id="3" name="Untertitel 2"/>
           <p:cNvSpPr>
             <a:spLocks noGrp="1"/>
           </p:cNvSpPr>
           <p:nvPr>
-            <p:ph idx="1"/>
+            <p:ph type="subTitle" idx="1"/>
           </p:nvPr>
         </p:nvSpPr>
         <p:spPr/>
         <p:txBody>
-          <a:bodyPr>
-            <a:normAutofit fontScale="70000" lnSpcReduction="20000"/>
-          </a:bodyPr>
+          <a:bodyPr/>
           <a:lstStyle/>
           <a:p>
-            <a:pPr>
-              <a:lnSpc>
-                <a:spcPct val="150000"/>
-              </a:lnSpc>
-            </a:pPr>
-            <a:r>
-              <a:rPr lang="de-DE" dirty="0" smtClean="0"/>
-              <a:t>Kurzbeschreibung</a:t>
-            </a:r>
-          </a:p>
-          <a:p>
-            <a:pPr>
-              <a:lnSpc>
-                <a:spcPct val="150000"/>
-              </a:lnSpc>
-            </a:pPr>
-            <a:r>
-              <a:rPr lang="de-DE" dirty="0" smtClean="0"/>
-              <a:t>Bilder und Skizzen des Projektes</a:t>
-            </a:r>
-          </a:p>
-          <a:p>
-            <a:pPr>
-              <a:lnSpc>
-                <a:spcPct val="150000"/>
-              </a:lnSpc>
-            </a:pPr>
-            <a:r>
-              <a:rPr lang="de-DE" dirty="0" smtClean="0"/>
-              <a:t>Aufgabenverteilung</a:t>
-            </a:r>
-          </a:p>
-          <a:p>
-            <a:pPr>
-              <a:lnSpc>
-                <a:spcPct val="150000"/>
-              </a:lnSpc>
-            </a:pPr>
-            <a:r>
-              <a:rPr lang="de-DE" dirty="0" smtClean="0"/>
-              <a:t>Zeitplan</a:t>
-            </a:r>
-          </a:p>
-          <a:p>
-            <a:pPr>
-              <a:lnSpc>
-                <a:spcPct val="150000"/>
-              </a:lnSpc>
-            </a:pPr>
-            <a:r>
-              <a:rPr lang="de-DE" dirty="0" smtClean="0"/>
-              <a:t>Meilensteine</a:t>
-            </a:r>
-          </a:p>
-          <a:p>
-            <a:pPr>
-              <a:lnSpc>
-                <a:spcPct val="150000"/>
-              </a:lnSpc>
-            </a:pPr>
-            <a:r>
-              <a:rPr lang="de-DE" dirty="0" smtClean="0"/>
-              <a:t>Risiko</a:t>
-            </a:r>
-            <a:endParaRPr lang="de-DE" dirty="0"/>
+            <a:r>
+              <a:rPr lang="de-DE" sz="2400" dirty="0" smtClean="0">
+                <a:solidFill>
+                  <a:schemeClr val="bg1"/>
+                </a:solidFill>
+              </a:rPr>
+              <a:t>Gruppe: 4</a:t>
+            </a:r>
+          </a:p>
+          <a:p>
+            <a:r>
+              <a:rPr lang="de-DE" sz="2400" dirty="0" smtClean="0">
+                <a:solidFill>
+                  <a:schemeClr val="bg1"/>
+                </a:solidFill>
+              </a:rPr>
+              <a:t>Ludwig Loth, Markus Wiegand, Nils Jahnel, Sven </a:t>
+            </a:r>
+            <a:r>
+              <a:rPr lang="de-DE" sz="2400" dirty="0" err="1" smtClean="0">
+                <a:solidFill>
+                  <a:schemeClr val="bg1"/>
+                </a:solidFill>
+              </a:rPr>
+              <a:t>Wernikowski</a:t>
+            </a:r>
+            <a:endParaRPr lang="de-DE" sz="2400" dirty="0">
+              <a:solidFill>
+                <a:schemeClr val="bg1"/>
+              </a:solidFill>
+            </a:endParaRPr>
           </a:p>
         </p:txBody>
       </p:sp>
     </p:spTree>
     <p:extLst>
       <p:ext uri="{BB962C8B-B14F-4D97-AF65-F5344CB8AC3E}">
-        <p14:creationId xmlns:p14="http://schemas.microsoft.com/office/powerpoint/2010/main" val="515572243"/>
+        <p14:creationId xmlns:p14="http://schemas.microsoft.com/office/powerpoint/2010/main" val="3646409148"/>
       </p:ext>
     </p:extLst>
   </p:cSld>
@@ -9735,6 +10232,151 @@
           <a:p>
             <a:r>
               <a:rPr lang="de-DE" dirty="0" smtClean="0"/>
+              <a:t>Gliederung	</a:t>
+            </a:r>
+            <a:endParaRPr lang="de-DE" dirty="0"/>
+          </a:p>
+        </p:txBody>
+      </p:sp>
+      <p:sp>
+        <p:nvSpPr>
+          <p:cNvPr id="3" name="Inhaltsplatzhalter 2"/>
+          <p:cNvSpPr>
+            <a:spLocks noGrp="1"/>
+          </p:cNvSpPr>
+          <p:nvPr>
+            <p:ph idx="1"/>
+          </p:nvPr>
+        </p:nvSpPr>
+        <p:spPr/>
+        <p:txBody>
+          <a:bodyPr>
+            <a:normAutofit fontScale="70000" lnSpcReduction="20000"/>
+          </a:bodyPr>
+          <a:lstStyle/>
+          <a:p>
+            <a:pPr>
+              <a:lnSpc>
+                <a:spcPct val="150000"/>
+              </a:lnSpc>
+            </a:pPr>
+            <a:r>
+              <a:rPr lang="de-DE" dirty="0" smtClean="0"/>
+              <a:t>Kurzbeschreibung</a:t>
+            </a:r>
+          </a:p>
+          <a:p>
+            <a:pPr>
+              <a:lnSpc>
+                <a:spcPct val="150000"/>
+              </a:lnSpc>
+            </a:pPr>
+            <a:r>
+              <a:rPr lang="de-DE" dirty="0" smtClean="0"/>
+              <a:t>Bilder und Skizzen des Projektes</a:t>
+            </a:r>
+          </a:p>
+          <a:p>
+            <a:pPr>
+              <a:lnSpc>
+                <a:spcPct val="150000"/>
+              </a:lnSpc>
+            </a:pPr>
+            <a:r>
+              <a:rPr lang="de-DE" dirty="0" smtClean="0"/>
+              <a:t>Aufgabenverteilung</a:t>
+            </a:r>
+          </a:p>
+          <a:p>
+            <a:pPr>
+              <a:lnSpc>
+                <a:spcPct val="150000"/>
+              </a:lnSpc>
+            </a:pPr>
+            <a:r>
+              <a:rPr lang="de-DE" dirty="0" smtClean="0"/>
+              <a:t>Zeitplan</a:t>
+            </a:r>
+          </a:p>
+          <a:p>
+            <a:pPr>
+              <a:lnSpc>
+                <a:spcPct val="150000"/>
+              </a:lnSpc>
+            </a:pPr>
+            <a:r>
+              <a:rPr lang="de-DE" dirty="0" smtClean="0"/>
+              <a:t>Meilensteine</a:t>
+            </a:r>
+          </a:p>
+          <a:p>
+            <a:pPr>
+              <a:lnSpc>
+                <a:spcPct val="150000"/>
+              </a:lnSpc>
+            </a:pPr>
+            <a:r>
+              <a:rPr lang="de-DE" dirty="0" smtClean="0"/>
+              <a:t>Risiko</a:t>
+            </a:r>
+            <a:endParaRPr lang="de-DE" dirty="0"/>
+          </a:p>
+        </p:txBody>
+      </p:sp>
+    </p:spTree>
+    <p:extLst>
+      <p:ext uri="{BB962C8B-B14F-4D97-AF65-F5344CB8AC3E}">
+        <p14:creationId xmlns:p14="http://schemas.microsoft.com/office/powerpoint/2010/main" val="515572243"/>
+      </p:ext>
+    </p:extLst>
+  </p:cSld>
+  <p:clrMapOvr>
+    <a:masterClrMapping/>
+  </p:clrMapOvr>
+  <p:timing>
+    <p:tnLst>
+      <p:par>
+        <p:cTn id="1" dur="indefinite" restart="never" nodeType="tmRoot"/>
+      </p:par>
+    </p:tnLst>
+  </p:timing>
+</p:sld>
+</file>
+
+<file path=ppt/slides/slide26.xml><?xml version="1.0" encoding="utf-8"?>
+<p:sld xmlns:a="http://schemas.openxmlformats.org/drawingml/2006/main" xmlns:r="http://schemas.openxmlformats.org/officeDocument/2006/relationships" xmlns:p="http://schemas.openxmlformats.org/presentationml/2006/main">
+  <p:cSld>
+    <p:spTree>
+      <p:nvGrpSpPr>
+        <p:cNvPr id="1" name=""/>
+        <p:cNvGrpSpPr/>
+        <p:nvPr/>
+      </p:nvGrpSpPr>
+      <p:grpSpPr>
+        <a:xfrm>
+          <a:off x="0" y="0"/>
+          <a:ext cx="0" cy="0"/>
+          <a:chOff x="0" y="0"/>
+          <a:chExt cx="0" cy="0"/>
+        </a:xfrm>
+      </p:grpSpPr>
+      <p:sp>
+        <p:nvSpPr>
+          <p:cNvPr id="2" name="Titel 1"/>
+          <p:cNvSpPr>
+            <a:spLocks noGrp="1"/>
+          </p:cNvSpPr>
+          <p:nvPr>
+            <p:ph type="title"/>
+          </p:nvPr>
+        </p:nvSpPr>
+        <p:spPr/>
+        <p:txBody>
+          <a:bodyPr/>
+          <a:lstStyle/>
+          <a:p>
+            <a:r>
+              <a:rPr lang="de-DE" dirty="0" smtClean="0"/>
               <a:t>Kurzbeschreibung</a:t>
             </a:r>
             <a:endParaRPr lang="de-DE" dirty="0"/>
@@ -9826,7 +10468,7 @@
 </p:sld>
 </file>
 
-<file path=ppt/slides/slide26.xml><?xml version="1.0" encoding="utf-8"?>
+<file path=ppt/slides/slide27.xml><?xml version="1.0" encoding="utf-8"?>
 <p:sld xmlns:a="http://schemas.openxmlformats.org/drawingml/2006/main" xmlns:r="http://schemas.openxmlformats.org/officeDocument/2006/relationships" xmlns:p="http://schemas.openxmlformats.org/presentationml/2006/main">
   <p:cSld>
     <p:spTree>
@@ -10008,7 +10650,7 @@
 </p:sld>
 </file>
 
-<file path=ppt/slides/slide27.xml><?xml version="1.0" encoding="utf-8"?>
+<file path=ppt/slides/slide28.xml><?xml version="1.0" encoding="utf-8"?>
 <p:sld xmlns:a="http://schemas.openxmlformats.org/drawingml/2006/main" xmlns:r="http://schemas.openxmlformats.org/officeDocument/2006/relationships" xmlns:p="http://schemas.openxmlformats.org/presentationml/2006/main">
   <p:cSld>
     <p:spTree>
@@ -10137,7 +10779,7 @@
 </p:sld>
 </file>
 
-<file path=ppt/slides/slide28.xml><?xml version="1.0" encoding="utf-8"?>
+<file path=ppt/slides/slide29.xml><?xml version="1.0" encoding="utf-8"?>
 <p:sld xmlns:a="http://schemas.openxmlformats.org/drawingml/2006/main" xmlns:r="http://schemas.openxmlformats.org/officeDocument/2006/relationships" xmlns:p="http://schemas.openxmlformats.org/presentationml/2006/main">
   <p:cSld>
     <p:spTree>
@@ -10293,129 +10935,6 @@
 </p:sld>
 </file>
 
-<file path=ppt/slides/slide29.xml><?xml version="1.0" encoding="utf-8"?>
-<p:sld xmlns:a="http://schemas.openxmlformats.org/drawingml/2006/main" xmlns:r="http://schemas.openxmlformats.org/officeDocument/2006/relationships" xmlns:p="http://schemas.openxmlformats.org/presentationml/2006/main">
-  <p:cSld>
-    <p:spTree>
-      <p:nvGrpSpPr>
-        <p:cNvPr id="1" name=""/>
-        <p:cNvGrpSpPr/>
-        <p:nvPr/>
-      </p:nvGrpSpPr>
-      <p:grpSpPr>
-        <a:xfrm>
-          <a:off x="0" y="0"/>
-          <a:ext cx="0" cy="0"/>
-          <a:chOff x="0" y="0"/>
-          <a:chExt cx="0" cy="0"/>
-        </a:xfrm>
-      </p:grpSpPr>
-      <p:sp>
-        <p:nvSpPr>
-          <p:cNvPr id="2" name="Titel 1"/>
-          <p:cNvSpPr>
-            <a:spLocks noGrp="1"/>
-          </p:cNvSpPr>
-          <p:nvPr>
-            <p:ph type="title"/>
-          </p:nvPr>
-        </p:nvSpPr>
-        <p:spPr/>
-        <p:txBody>
-          <a:bodyPr/>
-          <a:lstStyle/>
-          <a:p>
-            <a:r>
-              <a:rPr lang="de-DE" dirty="0" smtClean="0"/>
-              <a:t>Meilensteine</a:t>
-            </a:r>
-            <a:endParaRPr lang="de-DE" dirty="0"/>
-          </a:p>
-        </p:txBody>
-      </p:sp>
-      <p:sp>
-        <p:nvSpPr>
-          <p:cNvPr id="3" name="Inhaltsplatzhalter 2"/>
-          <p:cNvSpPr>
-            <a:spLocks noGrp="1"/>
-          </p:cNvSpPr>
-          <p:nvPr>
-            <p:ph idx="1"/>
-          </p:nvPr>
-        </p:nvSpPr>
-        <p:spPr/>
-        <p:txBody>
-          <a:bodyPr/>
-          <a:lstStyle/>
-          <a:p>
-            <a:pPr lvl="1">
-              <a:buFont typeface="Arial" panose="020B0604020202020204" pitchFamily="34" charset="0"/>
-              <a:buChar char="•"/>
-            </a:pPr>
-            <a:r>
-              <a:rPr lang="de-DE" sz="2000" dirty="0" smtClean="0"/>
-              <a:t>Meilenstein 3</a:t>
-            </a:r>
-          </a:p>
-          <a:p>
-            <a:pPr lvl="2">
-              <a:buFont typeface="Symbol" panose="05050102010706020507" pitchFamily="18" charset="2"/>
-              <a:buChar char="-"/>
-            </a:pPr>
-            <a:r>
-              <a:rPr lang="de-DE" sz="2000" dirty="0" smtClean="0"/>
-              <a:t>Offizielle </a:t>
-            </a:r>
-            <a:r>
-              <a:rPr lang="de-DE" sz="2000" dirty="0"/>
-              <a:t>Modelle für das Auto und die Strecke an sich.</a:t>
-            </a:r>
-          </a:p>
-          <a:p>
-            <a:pPr lvl="2">
-              <a:buFont typeface="Symbol" panose="05050102010706020507" pitchFamily="18" charset="2"/>
-              <a:buChar char="-"/>
-            </a:pPr>
-            <a:r>
-              <a:rPr lang="de-DE" sz="2000" dirty="0"/>
-              <a:t>Erste </a:t>
-            </a:r>
-            <a:r>
-              <a:rPr lang="de-DE" sz="2000" dirty="0" smtClean="0"/>
-              <a:t>Texturierung</a:t>
-            </a:r>
-          </a:p>
-          <a:p>
-            <a:pPr lvl="2">
-              <a:buFont typeface="Symbol" panose="05050102010706020507" pitchFamily="18" charset="2"/>
-              <a:buChar char="-"/>
-            </a:pPr>
-            <a:r>
-              <a:rPr lang="de-DE" sz="2000" dirty="0" smtClean="0"/>
-              <a:t>Zusammenführung der einzelnen Teile</a:t>
-            </a:r>
-          </a:p>
-          <a:p>
-            <a:pPr marL="914400" lvl="2" indent="0">
-              <a:buNone/>
-            </a:pPr>
-            <a:endParaRPr lang="de-DE" sz="1600" dirty="0" smtClean="0"/>
-          </a:p>
-        </p:txBody>
-      </p:sp>
-    </p:spTree>
-    <p:extLst>
-      <p:ext uri="{BB962C8B-B14F-4D97-AF65-F5344CB8AC3E}">
-        <p14:creationId xmlns:p14="http://schemas.microsoft.com/office/powerpoint/2010/main" val="1953529443"/>
-      </p:ext>
-    </p:extLst>
-  </p:cSld>
-  <p:clrMapOvr>
-    <a:masterClrMapping/>
-  </p:clrMapOvr>
-</p:sld>
-</file>
-
 <file path=ppt/slides/slide3.xml><?xml version="1.0" encoding="utf-8"?>
 <p:sld xmlns:a="http://schemas.openxmlformats.org/drawingml/2006/main" xmlns:r="http://schemas.openxmlformats.org/officeDocument/2006/relationships" xmlns:p="http://schemas.openxmlformats.org/presentationml/2006/main">
   <p:cSld>
@@ -10521,7 +11040,6 @@
               <a:rPr lang="de-DE" dirty="0"/>
               <a:t> ein, fahr los und meistere dieses Abenteuer um der König der Karren zu werden.</a:t>
             </a:r>
-            <a:endParaRPr lang="de-DE" dirty="0"/>
           </a:p>
         </p:txBody>
       </p:sp>
@@ -10600,82 +11118,71 @@
           <a:bodyPr/>
           <a:lstStyle/>
           <a:p>
+            <a:pPr lvl="1">
+              <a:buFont typeface="Arial" panose="020B0604020202020204" pitchFamily="34" charset="0"/>
+              <a:buChar char="•"/>
+            </a:pPr>
+            <a:r>
+              <a:rPr lang="de-DE" sz="2000" dirty="0" smtClean="0"/>
+              <a:t>Meilenstein 3</a:t>
+            </a:r>
+          </a:p>
+          <a:p>
+            <a:pPr lvl="2">
+              <a:buFont typeface="Symbol" panose="05050102010706020507" pitchFamily="18" charset="2"/>
+              <a:buChar char="-"/>
+            </a:pPr>
+            <a:r>
+              <a:rPr lang="de-DE" sz="2000" dirty="0" smtClean="0"/>
+              <a:t>Offizielle </a:t>
+            </a:r>
             <a:r>
               <a:rPr lang="de-DE" sz="2000" dirty="0"/>
-              <a:t>Bonus: Ein </a:t>
+              <a:t>Modelle für das Auto und die Strecke an sich.</a:t>
+            </a:r>
+          </a:p>
+          <a:p>
+            <a:pPr lvl="2">
+              <a:buFont typeface="Symbol" panose="05050102010706020507" pitchFamily="18" charset="2"/>
+              <a:buChar char="-"/>
+            </a:pPr>
+            <a:r>
+              <a:rPr lang="de-DE" sz="2000" dirty="0"/>
+              <a:t>Erste </a:t>
             </a:r>
             <a:r>
               <a:rPr lang="de-DE" sz="2000" dirty="0" smtClean="0"/>
-              <a:t>Auto-Editor</a:t>
-            </a:r>
-          </a:p>
-          <a:p>
-            <a:pPr lvl="1"/>
+              <a:t>Texturierung</a:t>
+            </a:r>
+          </a:p>
+          <a:p>
+            <a:pPr lvl="2">
+              <a:buFont typeface="Symbol" panose="05050102010706020507" pitchFamily="18" charset="2"/>
+              <a:buChar char="-"/>
+            </a:pPr>
             <a:r>
               <a:rPr lang="de-DE" sz="2000" dirty="0" smtClean="0"/>
-              <a:t>Wenn noch Zeit bleibt!</a:t>
-            </a:r>
-          </a:p>
-          <a:p>
-            <a:pPr lvl="2"/>
-            <a:r>
-              <a:rPr lang="de-DE" sz="2000" dirty="0" smtClean="0"/>
-              <a:t>Vor dem eigentlichen Start des Rennens!</a:t>
-            </a:r>
-          </a:p>
-          <a:p>
-            <a:pPr lvl="2"/>
-            <a:r>
-              <a:rPr lang="de-DE" sz="2000" dirty="0" smtClean="0"/>
-              <a:t>Multiplayer</a:t>
+              <a:t>Zusammenführung der einzelnen Teile</a:t>
             </a:r>
           </a:p>
           <a:p>
             <a:pPr marL="914400" lvl="2" indent="0">
               <a:buNone/>
             </a:pPr>
-            <a:endParaRPr lang="de-DE" sz="2000" dirty="0" smtClean="0"/>
-          </a:p>
-          <a:p>
-            <a:pPr lvl="2"/>
-            <a:r>
-              <a:rPr lang="de-DE" sz="2000" dirty="0" smtClean="0"/>
-              <a:t>Evtl. auch Auswahl der Strecke selbst.</a:t>
-            </a:r>
-          </a:p>
-          <a:p>
-            <a:pPr lvl="3"/>
-            <a:r>
-              <a:rPr lang="de-DE" dirty="0" smtClean="0"/>
-              <a:t>(Voraussetzung: Unterschiedliche Streckenmodelle)</a:t>
-            </a:r>
-            <a:endParaRPr lang="de-DE" dirty="0"/>
-          </a:p>
-          <a:p>
-            <a:endParaRPr lang="de-DE" sz="2400" dirty="0"/>
-          </a:p>
-          <a:p>
-            <a:endParaRPr lang="de-DE" sz="2400" dirty="0"/>
+            <a:endParaRPr lang="de-DE" sz="1600" dirty="0" smtClean="0"/>
           </a:p>
         </p:txBody>
       </p:sp>
     </p:spTree>
     <p:extLst>
       <p:ext uri="{BB962C8B-B14F-4D97-AF65-F5344CB8AC3E}">
-        <p14:creationId xmlns:p14="http://schemas.microsoft.com/office/powerpoint/2010/main" val="3662122320"/>
+        <p14:creationId xmlns:p14="http://schemas.microsoft.com/office/powerpoint/2010/main" val="1953529443"/>
       </p:ext>
     </p:extLst>
   </p:cSld>
   <p:clrMapOvr>
     <a:masterClrMapping/>
   </p:clrMapOvr>
-  <p:timing>
-    <p:tnLst>
-      <p:par>
-        <p:cTn id="1" dur="indefinite" restart="never" nodeType="tmRoot"/>
-      </p:par>
-    </p:tnLst>
-  </p:timing>
 </p:sld>
 </file>
 
@@ -10713,7 +11220,7 @@
           <a:p>
             <a:r>
               <a:rPr lang="de-DE" dirty="0" smtClean="0"/>
-              <a:t>Das Größte Risiko</a:t>
+              <a:t>Meilensteine</a:t>
             </a:r>
             <a:endParaRPr lang="de-DE" dirty="0"/>
           </a:p>
@@ -10735,63 +11242,68 @@
           <a:lstStyle/>
           <a:p>
             <a:r>
-              <a:rPr lang="de-DE" dirty="0" smtClean="0"/>
-              <a:t>Die Umwelt reagiert nicht…</a:t>
-            </a:r>
-          </a:p>
-          <a:p>
-            <a:pPr marL="800100" lvl="3" indent="-342900"/>
-            <a:r>
-              <a:rPr lang="de-DE" dirty="0"/>
-              <a:t>Sie ist implementiert, tut aber nicht das was sie tun soll</a:t>
-            </a:r>
-            <a:r>
-              <a:rPr lang="de-DE" dirty="0" smtClean="0"/>
-              <a:t>!</a:t>
-            </a:r>
-          </a:p>
-          <a:p>
-            <a:r>
-              <a:rPr lang="de-DE" dirty="0" smtClean="0"/>
-              <a:t>Power </a:t>
-            </a:r>
-            <a:r>
-              <a:rPr lang="de-DE" dirty="0" err="1" smtClean="0"/>
-              <a:t>Ups</a:t>
-            </a:r>
-            <a:r>
-              <a:rPr lang="de-DE" dirty="0" smtClean="0"/>
-              <a:t> funktionieren nicht so wie geplant</a:t>
+              <a:rPr lang="de-DE" sz="2000" dirty="0"/>
+              <a:t>Bonus: Ein </a:t>
+            </a:r>
+            <a:r>
+              <a:rPr lang="de-DE" sz="2000" dirty="0" smtClean="0"/>
+              <a:t>Auto-Editor</a:t>
             </a:r>
           </a:p>
           <a:p>
             <a:pPr lvl="1"/>
             <a:r>
               <a:rPr lang="de-DE" sz="2000" dirty="0" smtClean="0"/>
-              <a:t>Geschosse zu ungenau oder schlagen falsch auf!</a:t>
-            </a:r>
-            <a:endParaRPr lang="de-DE" sz="2000" dirty="0"/>
-          </a:p>
-          <a:p>
-            <a:r>
-              <a:rPr lang="de-DE" dirty="0" smtClean="0"/>
-              <a:t>Check</a:t>
-            </a:r>
-            <a:r>
-              <a:rPr lang="de-DE" dirty="0"/>
-              <a:t>point wird nicht richtig </a:t>
-            </a:r>
-            <a:r>
-              <a:rPr lang="de-DE" dirty="0" smtClean="0"/>
-              <a:t>gewertet</a:t>
-            </a:r>
+              <a:t>Wenn noch Zeit bleibt!</a:t>
+            </a:r>
+          </a:p>
+          <a:p>
+            <a:pPr lvl="2"/>
+            <a:r>
+              <a:rPr lang="de-DE" sz="2000" dirty="0" smtClean="0"/>
+              <a:t>Vor dem eigentlichen Start des Rennens!</a:t>
+            </a:r>
+          </a:p>
+          <a:p>
+            <a:pPr lvl="2"/>
+            <a:r>
+              <a:rPr lang="de-DE" sz="2000" dirty="0" smtClean="0"/>
+              <a:t>Multiplayer</a:t>
+            </a:r>
+          </a:p>
+          <a:p>
+            <a:pPr marL="914400" lvl="2" indent="0">
+              <a:buNone/>
+            </a:pPr>
+            <a:endParaRPr lang="de-DE" sz="2000" dirty="0" smtClean="0"/>
+          </a:p>
+          <a:p>
+            <a:pPr lvl="2"/>
+            <a:r>
+              <a:rPr lang="de-DE" sz="2000" dirty="0" smtClean="0"/>
+              <a:t>Evtl. auch Auswahl der Strecke selbst.</a:t>
+            </a:r>
+          </a:p>
+          <a:p>
+            <a:pPr lvl="3"/>
+            <a:r>
+              <a:rPr lang="de-DE" dirty="0" smtClean="0"/>
+              <a:t>(Voraussetzung: Unterschiedliche Streckenmodelle)</a:t>
+            </a:r>
+            <a:endParaRPr lang="de-DE" dirty="0"/>
+          </a:p>
+          <a:p>
+            <a:endParaRPr lang="de-DE" sz="2400" dirty="0"/>
+          </a:p>
+          <a:p>
+            <a:endParaRPr lang="de-DE" sz="2400" dirty="0"/>
           </a:p>
         </p:txBody>
       </p:sp>
     </p:spTree>
     <p:extLst>
       <p:ext uri="{BB962C8B-B14F-4D97-AF65-F5344CB8AC3E}">
-        <p14:creationId xmlns:p14="http://schemas.microsoft.com/office/powerpoint/2010/main" val="480467576"/>
+        <p14:creationId xmlns:p14="http://schemas.microsoft.com/office/powerpoint/2010/main" val="3662122320"/>
       </p:ext>
     </p:extLst>
   </p:cSld>
@@ -10864,6 +11376,135 @@
           <a:lstStyle/>
           <a:p>
             <a:r>
+              <a:rPr lang="de-DE" dirty="0" smtClean="0"/>
+              <a:t>Die Umwelt reagiert nicht…</a:t>
+            </a:r>
+          </a:p>
+          <a:p>
+            <a:pPr marL="800100" lvl="3" indent="-342900"/>
+            <a:r>
+              <a:rPr lang="de-DE" dirty="0"/>
+              <a:t>Sie ist implementiert, tut aber nicht das was sie tun soll</a:t>
+            </a:r>
+            <a:r>
+              <a:rPr lang="de-DE" dirty="0" smtClean="0"/>
+              <a:t>!</a:t>
+            </a:r>
+          </a:p>
+          <a:p>
+            <a:r>
+              <a:rPr lang="de-DE" dirty="0" smtClean="0"/>
+              <a:t>Power </a:t>
+            </a:r>
+            <a:r>
+              <a:rPr lang="de-DE" dirty="0" err="1" smtClean="0"/>
+              <a:t>Ups</a:t>
+            </a:r>
+            <a:r>
+              <a:rPr lang="de-DE" dirty="0" smtClean="0"/>
+              <a:t> funktionieren nicht so wie geplant</a:t>
+            </a:r>
+          </a:p>
+          <a:p>
+            <a:pPr lvl="1"/>
+            <a:r>
+              <a:rPr lang="de-DE" sz="2000" dirty="0" smtClean="0"/>
+              <a:t>Geschosse zu ungenau oder schlagen falsch auf!</a:t>
+            </a:r>
+            <a:endParaRPr lang="de-DE" sz="2000" dirty="0"/>
+          </a:p>
+          <a:p>
+            <a:r>
+              <a:rPr lang="de-DE" dirty="0" smtClean="0"/>
+              <a:t>Check</a:t>
+            </a:r>
+            <a:r>
+              <a:rPr lang="de-DE" dirty="0"/>
+              <a:t>point wird nicht richtig </a:t>
+            </a:r>
+            <a:r>
+              <a:rPr lang="de-DE" dirty="0" smtClean="0"/>
+              <a:t>gewertet</a:t>
+            </a:r>
+          </a:p>
+        </p:txBody>
+      </p:sp>
+    </p:spTree>
+    <p:extLst>
+      <p:ext uri="{BB962C8B-B14F-4D97-AF65-F5344CB8AC3E}">
+        <p14:creationId xmlns:p14="http://schemas.microsoft.com/office/powerpoint/2010/main" val="480467576"/>
+      </p:ext>
+    </p:extLst>
+  </p:cSld>
+  <p:clrMapOvr>
+    <a:masterClrMapping/>
+  </p:clrMapOvr>
+  <p:timing>
+    <p:tnLst>
+      <p:par>
+        <p:cTn id="1" dur="indefinite" restart="never" nodeType="tmRoot"/>
+      </p:par>
+    </p:tnLst>
+  </p:timing>
+</p:sld>
+</file>
+
+<file path=ppt/slides/slide33.xml><?xml version="1.0" encoding="utf-8"?>
+<p:sld xmlns:a="http://schemas.openxmlformats.org/drawingml/2006/main" xmlns:r="http://schemas.openxmlformats.org/officeDocument/2006/relationships" xmlns:p="http://schemas.openxmlformats.org/presentationml/2006/main">
+  <p:cSld>
+    <p:spTree>
+      <p:nvGrpSpPr>
+        <p:cNvPr id="1" name=""/>
+        <p:cNvGrpSpPr/>
+        <p:nvPr/>
+      </p:nvGrpSpPr>
+      <p:grpSpPr>
+        <a:xfrm>
+          <a:off x="0" y="0"/>
+          <a:ext cx="0" cy="0"/>
+          <a:chOff x="0" y="0"/>
+          <a:chExt cx="0" cy="0"/>
+        </a:xfrm>
+      </p:grpSpPr>
+      <p:sp>
+        <p:nvSpPr>
+          <p:cNvPr id="2" name="Titel 1"/>
+          <p:cNvSpPr>
+            <a:spLocks noGrp="1"/>
+          </p:cNvSpPr>
+          <p:nvPr>
+            <p:ph type="title"/>
+          </p:nvPr>
+        </p:nvSpPr>
+        <p:spPr/>
+        <p:txBody>
+          <a:bodyPr/>
+          <a:lstStyle/>
+          <a:p>
+            <a:r>
+              <a:rPr lang="de-DE" dirty="0" smtClean="0"/>
+              <a:t>Das Größte Risiko</a:t>
+            </a:r>
+            <a:endParaRPr lang="de-DE" dirty="0"/>
+          </a:p>
+        </p:txBody>
+      </p:sp>
+      <p:sp>
+        <p:nvSpPr>
+          <p:cNvPr id="3" name="Inhaltsplatzhalter 2"/>
+          <p:cNvSpPr>
+            <a:spLocks noGrp="1"/>
+          </p:cNvSpPr>
+          <p:nvPr>
+            <p:ph idx="1"/>
+          </p:nvPr>
+        </p:nvSpPr>
+        <p:spPr/>
+        <p:txBody>
+          <a:bodyPr/>
+          <a:lstStyle/>
+          <a:p>
+            <a:r>
               <a:rPr lang="de-DE" dirty="0" err="1" smtClean="0"/>
               <a:t>Respawn</a:t>
             </a:r>
@@ -10946,7 +11587,7 @@
 </p:sld>
 </file>
 
-<file path=ppt/slides/slide33.xml><?xml version="1.0" encoding="utf-8"?>
+<file path=ppt/slides/slide34.xml><?xml version="1.0" encoding="utf-8"?>
 <p:sld xmlns:a="http://schemas.openxmlformats.org/drawingml/2006/main" xmlns:r="http://schemas.openxmlformats.org/officeDocument/2006/relationships" xmlns:p="http://schemas.openxmlformats.org/presentationml/2006/main">
   <p:cSld>
     <p:spTree>
@@ -11262,6 +11903,73 @@
           <a:p>
             <a:r>
               <a:rPr lang="de-DE" dirty="0" smtClean="0"/>
+              <a:t>Code &amp; Erläuterung</a:t>
+            </a:r>
+            <a:br>
+              <a:rPr lang="de-DE" dirty="0" smtClean="0"/>
+            </a:br>
+            <a:r>
+              <a:rPr lang="de-DE" sz="3200" dirty="0" smtClean="0"/>
+              <a:t>index.html</a:t>
+            </a:r>
+            <a:endParaRPr lang="de-DE" sz="3200" dirty="0"/>
+          </a:p>
+        </p:txBody>
+      </p:sp>
+    </p:spTree>
+    <p:extLst>
+      <p:ext uri="{BB962C8B-B14F-4D97-AF65-F5344CB8AC3E}">
+        <p14:creationId xmlns:p14="http://schemas.microsoft.com/office/powerpoint/2010/main" val="4248061759"/>
+      </p:ext>
+    </p:extLst>
+  </p:cSld>
+  <p:clrMapOvr>
+    <a:masterClrMapping/>
+  </p:clrMapOvr>
+  <p:timing>
+    <p:tnLst>
+      <p:par>
+        <p:cTn id="1" dur="indefinite" restart="never" nodeType="tmRoot"/>
+      </p:par>
+    </p:tnLst>
+  </p:timing>
+</p:sld>
+</file>
+
+<file path=ppt/slides/slide7.xml><?xml version="1.0" encoding="utf-8"?>
+<p:sld xmlns:a="http://schemas.openxmlformats.org/drawingml/2006/main" xmlns:r="http://schemas.openxmlformats.org/officeDocument/2006/relationships" xmlns:p="http://schemas.openxmlformats.org/presentationml/2006/main">
+  <p:cSld>
+    <p:spTree>
+      <p:nvGrpSpPr>
+        <p:cNvPr id="1" name=""/>
+        <p:cNvGrpSpPr/>
+        <p:nvPr/>
+      </p:nvGrpSpPr>
+      <p:grpSpPr>
+        <a:xfrm>
+          <a:off x="0" y="0"/>
+          <a:ext cx="0" cy="0"/>
+          <a:chOff x="0" y="0"/>
+          <a:chExt cx="0" cy="0"/>
+        </a:xfrm>
+      </p:grpSpPr>
+      <p:sp>
+        <p:nvSpPr>
+          <p:cNvPr id="2" name="Titel 1"/>
+          <p:cNvSpPr>
+            <a:spLocks noGrp="1"/>
+          </p:cNvSpPr>
+          <p:nvPr>
+            <p:ph type="title"/>
+          </p:nvPr>
+        </p:nvSpPr>
+        <p:spPr/>
+        <p:txBody>
+          <a:bodyPr/>
+          <a:lstStyle/>
+          <a:p>
+            <a:r>
+              <a:rPr lang="de-DE" dirty="0" smtClean="0"/>
               <a:t>Herausforderungen</a:t>
             </a:r>
             <a:br>
@@ -11539,7 +12247,6 @@
               <a:rPr lang="de-DE" sz="2000" dirty="0" smtClean="0"/>
               <a:t>Implementierung von fertigen Modellen</a:t>
             </a:r>
-            <a:endParaRPr lang="de-DE" sz="2000" dirty="0" smtClean="0"/>
           </a:p>
         </p:txBody>
       </p:sp>
@@ -11650,7 +12357,7 @@
 </p:sld>
 </file>
 
-<file path=ppt/slides/slide7.xml><?xml version="1.0" encoding="utf-8"?>
+<file path=ppt/slides/slide8.xml><?xml version="1.0" encoding="utf-8"?>
 <p:sld xmlns:a="http://schemas.openxmlformats.org/drawingml/2006/main" xmlns:r="http://schemas.openxmlformats.org/officeDocument/2006/relationships" xmlns:p="http://schemas.openxmlformats.org/presentationml/2006/main">
   <p:cSld>
     <p:spTree>
@@ -11968,7 +12675,6 @@
               <a:rPr lang="de-DE" sz="1600" dirty="0" smtClean="0"/>
               <a:t>Modelle nun nicht mehr notwendig</a:t>
             </a:r>
-            <a:endParaRPr lang="de-DE" sz="1600" dirty="0" smtClean="0"/>
           </a:p>
         </p:txBody>
       </p:sp>
@@ -12164,7 +12870,7 @@
 </p:sld>
 </file>
 
-<file path=ppt/slides/slide8.xml><?xml version="1.0" encoding="utf-8"?>
+<file path=ppt/slides/slide9.xml><?xml version="1.0" encoding="utf-8"?>
 <p:sld xmlns:a="http://schemas.openxmlformats.org/drawingml/2006/main" xmlns:r="http://schemas.openxmlformats.org/officeDocument/2006/relationships" xmlns:p="http://schemas.openxmlformats.org/presentationml/2006/main">
   <p:cSld>
     <p:spTree>
@@ -12566,434 +13272,6 @@
     <p:extLst>
       <p:ext uri="{BB962C8B-B14F-4D97-AF65-F5344CB8AC3E}">
         <p14:creationId xmlns:p14="http://schemas.microsoft.com/office/powerpoint/2010/main" val="104137852"/>
-      </p:ext>
-    </p:extLst>
-  </p:cSld>
-  <p:clrMapOvr>
-    <a:masterClrMapping/>
-  </p:clrMapOvr>
-  <p:timing>
-    <p:tnLst>
-      <p:par>
-        <p:cTn id="1" dur="indefinite" restart="never" nodeType="tmRoot"/>
-      </p:par>
-    </p:tnLst>
-  </p:timing>
-</p:sld>
-</file>
-
-<file path=ppt/slides/slide9.xml><?xml version="1.0" encoding="utf-8"?>
-<p:sld xmlns:a="http://schemas.openxmlformats.org/drawingml/2006/main" xmlns:r="http://schemas.openxmlformats.org/officeDocument/2006/relationships" xmlns:p="http://schemas.openxmlformats.org/presentationml/2006/main">
-  <p:cSld>
-    <p:spTree>
-      <p:nvGrpSpPr>
-        <p:cNvPr id="1" name=""/>
-        <p:cNvGrpSpPr/>
-        <p:nvPr/>
-      </p:nvGrpSpPr>
-      <p:grpSpPr>
-        <a:xfrm>
-          <a:off x="0" y="0"/>
-          <a:ext cx="0" cy="0"/>
-          <a:chOff x="0" y="0"/>
-          <a:chExt cx="0" cy="0"/>
-        </a:xfrm>
-      </p:grpSpPr>
-      <p:sp>
-        <p:nvSpPr>
-          <p:cNvPr id="2" name="Titel 1"/>
-          <p:cNvSpPr>
-            <a:spLocks noGrp="1"/>
-          </p:cNvSpPr>
-          <p:nvPr>
-            <p:ph type="title"/>
-          </p:nvPr>
-        </p:nvSpPr>
-        <p:spPr/>
-        <p:txBody>
-          <a:bodyPr/>
-          <a:lstStyle/>
-          <a:p>
-            <a:r>
-              <a:rPr lang="de-DE" dirty="0" smtClean="0"/>
-              <a:t>Herausforderungen</a:t>
-            </a:r>
-            <a:br>
-              <a:rPr lang="de-DE" dirty="0" smtClean="0"/>
-            </a:br>
-            <a:r>
-              <a:rPr lang="de-DE" sz="3200" dirty="0" smtClean="0"/>
-              <a:t>Power </a:t>
-            </a:r>
-            <a:r>
-              <a:rPr lang="de-DE" sz="3200" dirty="0" err="1" smtClean="0"/>
-              <a:t>Ups</a:t>
-            </a:r>
-            <a:endParaRPr lang="de-DE" sz="3200" dirty="0"/>
-          </a:p>
-        </p:txBody>
-      </p:sp>
-      <p:sp>
-        <p:nvSpPr>
-          <p:cNvPr id="3" name="Inhaltsplatzhalter 2"/>
-          <p:cNvSpPr>
-            <a:spLocks noGrp="1"/>
-          </p:cNvSpPr>
-          <p:nvPr>
-            <p:ph idx="1"/>
-          </p:nvPr>
-        </p:nvSpPr>
-        <p:spPr>
-          <a:xfrm>
-            <a:off x="978090" y="2586094"/>
-            <a:ext cx="6787486" cy="1289872"/>
-          </a:xfrm>
-        </p:spPr>
-        <p:txBody>
-          <a:bodyPr>
-            <a:normAutofit/>
-          </a:bodyPr>
-          <a:lstStyle/>
-          <a:p>
-            <a:pPr algn="just"/>
-            <a:r>
-              <a:rPr lang="de-DE" dirty="0" smtClean="0"/>
-              <a:t>Endergebnis</a:t>
-            </a:r>
-          </a:p>
-          <a:p>
-            <a:pPr lvl="1" algn="just"/>
-            <a:r>
-              <a:rPr lang="de-DE" dirty="0" smtClean="0"/>
-              <a:t>Nur ein Einziges Power </a:t>
-            </a:r>
-            <a:r>
-              <a:rPr lang="de-DE" dirty="0" err="1" smtClean="0"/>
-              <a:t>Up</a:t>
-            </a:r>
-            <a:endParaRPr lang="de-DE" dirty="0" smtClean="0"/>
-          </a:p>
-        </p:txBody>
-      </p:sp>
-      <p:sp>
-        <p:nvSpPr>
-          <p:cNvPr id="4" name="Inhaltsplatzhalter 2"/>
-          <p:cNvSpPr txBox="1">
-            <a:spLocks/>
-          </p:cNvSpPr>
-          <p:nvPr/>
-        </p:nvSpPr>
-        <p:spPr bwMode="auto">
-          <a:xfrm>
-            <a:off x="7806519" y="2711197"/>
-            <a:ext cx="4012441" cy="2474951"/>
-          </a:xfrm>
-          <a:prstGeom prst="rect">
-            <a:avLst/>
-          </a:prstGeom>
-          <a:noFill/>
-          <a:ln>
-            <a:noFill/>
-          </a:ln>
-          <a:extLst>
-            <a:ext uri="{909E8E84-426E-40DD-AFC4-6F175D3DCCD1}">
-              <a14:hiddenFill xmlns:a14="http://schemas.microsoft.com/office/drawing/2010/main">
-                <a:solidFill>
-                  <a:srgbClr val="FFFFFF"/>
-                </a:solidFill>
-              </a14:hiddenFill>
-            </a:ext>
-            <a:ext uri="{91240B29-F687-4F45-9708-019B960494DF}">
-              <a14:hiddenLine xmlns:a14="http://schemas.microsoft.com/office/drawing/2010/main" w="9525">
-                <a:solidFill>
-                  <a:srgbClr val="000000"/>
-                </a:solidFill>
-                <a:miter lim="800000"/>
-                <a:headEnd/>
-                <a:tailEnd/>
-              </a14:hiddenLine>
-            </a:ext>
-          </a:extLst>
-        </p:spPr>
-        <p:txBody>
-          <a:bodyPr vert="horz" wrap="square" lIns="91440" tIns="45720" rIns="91440" bIns="45720" numCol="1" anchor="t" anchorCtr="0" compatLnSpc="1">
-            <a:prstTxWarp prst="textNoShape">
-              <a:avLst/>
-            </a:prstTxWarp>
-            <a:noAutofit/>
-          </a:bodyPr>
-          <a:lstStyle>
-            <a:lvl1pPr marL="342900" indent="-342900" algn="l" rtl="0" eaLnBrk="1" fontAlgn="base" hangingPunct="1">
-              <a:spcBef>
-                <a:spcPct val="20000"/>
-              </a:spcBef>
-              <a:spcAft>
-                <a:spcPct val="0"/>
-              </a:spcAft>
-              <a:buFont typeface="Arial" charset="0"/>
-              <a:buChar char="•"/>
-              <a:defRPr sz="3200" kern="1200">
-                <a:solidFill>
-                  <a:schemeClr val="tx1"/>
-                </a:solidFill>
-                <a:latin typeface="+mn-lt"/>
-                <a:ea typeface="+mn-ea"/>
-                <a:cs typeface="+mn-cs"/>
-              </a:defRPr>
-            </a:lvl1pPr>
-            <a:lvl2pPr marL="742950" indent="-285750" algn="l" rtl="0" eaLnBrk="1" fontAlgn="base" hangingPunct="1">
-              <a:spcBef>
-                <a:spcPct val="20000"/>
-              </a:spcBef>
-              <a:spcAft>
-                <a:spcPct val="0"/>
-              </a:spcAft>
-              <a:buFont typeface="Arial" charset="0"/>
-              <a:buChar char="–"/>
-              <a:defRPr sz="2800" kern="1200">
-                <a:solidFill>
-                  <a:schemeClr val="tx1"/>
-                </a:solidFill>
-                <a:latin typeface="+mn-lt"/>
-                <a:ea typeface="+mn-ea"/>
-                <a:cs typeface="+mn-cs"/>
-              </a:defRPr>
-            </a:lvl2pPr>
-            <a:lvl3pPr marL="1143000" indent="-228600" algn="l" rtl="0" eaLnBrk="1" fontAlgn="base" hangingPunct="1">
-              <a:spcBef>
-                <a:spcPct val="20000"/>
-              </a:spcBef>
-              <a:spcAft>
-                <a:spcPct val="0"/>
-              </a:spcAft>
-              <a:buFont typeface="Arial" charset="0"/>
-              <a:buChar char="•"/>
-              <a:defRPr sz="2400" kern="1200">
-                <a:solidFill>
-                  <a:schemeClr val="tx1"/>
-                </a:solidFill>
-                <a:latin typeface="+mn-lt"/>
-                <a:ea typeface="+mn-ea"/>
-                <a:cs typeface="+mn-cs"/>
-              </a:defRPr>
-            </a:lvl3pPr>
-            <a:lvl4pPr marL="1600200" indent="-228600" algn="l" rtl="0" eaLnBrk="1" fontAlgn="base" hangingPunct="1">
-              <a:spcBef>
-                <a:spcPct val="20000"/>
-              </a:spcBef>
-              <a:spcAft>
-                <a:spcPct val="0"/>
-              </a:spcAft>
-              <a:buFont typeface="Arial" charset="0"/>
-              <a:buChar char="–"/>
-              <a:defRPr sz="2000" kern="1200">
-                <a:solidFill>
-                  <a:schemeClr val="tx1"/>
-                </a:solidFill>
-                <a:latin typeface="+mn-lt"/>
-                <a:ea typeface="+mn-ea"/>
-                <a:cs typeface="+mn-cs"/>
-              </a:defRPr>
-            </a:lvl4pPr>
-            <a:lvl5pPr marL="2057400" indent="-228600" algn="l" rtl="0" eaLnBrk="1" fontAlgn="base" hangingPunct="1">
-              <a:spcBef>
-                <a:spcPct val="20000"/>
-              </a:spcBef>
-              <a:spcAft>
-                <a:spcPct val="0"/>
-              </a:spcAft>
-              <a:buFont typeface="Arial" charset="0"/>
-              <a:buChar char="»"/>
-              <a:defRPr sz="2000" kern="1200">
-                <a:solidFill>
-                  <a:schemeClr val="tx1"/>
-                </a:solidFill>
-                <a:latin typeface="+mn-lt"/>
-                <a:ea typeface="+mn-ea"/>
-                <a:cs typeface="+mn-cs"/>
-              </a:defRPr>
-            </a:lvl5pPr>
-            <a:lvl6pPr marL="2514600" indent="-228600" algn="l" defTabSz="914400" rtl="0" eaLnBrk="1" latinLnBrk="0" hangingPunct="1">
-              <a:spcBef>
-                <a:spcPct val="20000"/>
-              </a:spcBef>
-              <a:buFont typeface="Arial" pitchFamily="34" charset="0"/>
-              <a:buChar char="•"/>
-              <a:defRPr sz="2000" kern="1200">
-                <a:solidFill>
-                  <a:schemeClr val="tx1"/>
-                </a:solidFill>
-                <a:latin typeface="+mn-lt"/>
-                <a:ea typeface="+mn-ea"/>
-                <a:cs typeface="+mn-cs"/>
-              </a:defRPr>
-            </a:lvl6pPr>
-            <a:lvl7pPr marL="2971800" indent="-228600" algn="l" defTabSz="914400" rtl="0" eaLnBrk="1" latinLnBrk="0" hangingPunct="1">
-              <a:spcBef>
-                <a:spcPct val="20000"/>
-              </a:spcBef>
-              <a:buFont typeface="Arial" pitchFamily="34" charset="0"/>
-              <a:buChar char="•"/>
-              <a:defRPr sz="2000" kern="1200">
-                <a:solidFill>
-                  <a:schemeClr val="tx1"/>
-                </a:solidFill>
-                <a:latin typeface="+mn-lt"/>
-                <a:ea typeface="+mn-ea"/>
-                <a:cs typeface="+mn-cs"/>
-              </a:defRPr>
-            </a:lvl7pPr>
-            <a:lvl8pPr marL="3429000" indent="-228600" algn="l" defTabSz="914400" rtl="0" eaLnBrk="1" latinLnBrk="0" hangingPunct="1">
-              <a:spcBef>
-                <a:spcPct val="20000"/>
-              </a:spcBef>
-              <a:buFont typeface="Arial" pitchFamily="34" charset="0"/>
-              <a:buChar char="•"/>
-              <a:defRPr sz="2000" kern="1200">
-                <a:solidFill>
-                  <a:schemeClr val="tx1"/>
-                </a:solidFill>
-                <a:latin typeface="+mn-lt"/>
-                <a:ea typeface="+mn-ea"/>
-                <a:cs typeface="+mn-cs"/>
-              </a:defRPr>
-            </a:lvl8pPr>
-            <a:lvl9pPr marL="3886200" indent="-228600" algn="l" defTabSz="914400" rtl="0" eaLnBrk="1" latinLnBrk="0" hangingPunct="1">
-              <a:spcBef>
-                <a:spcPct val="20000"/>
-              </a:spcBef>
-              <a:buFont typeface="Arial" pitchFamily="34" charset="0"/>
-              <a:buChar char="•"/>
-              <a:defRPr sz="2000" kern="1200">
-                <a:solidFill>
-                  <a:schemeClr val="tx1"/>
-                </a:solidFill>
-                <a:latin typeface="+mn-lt"/>
-                <a:ea typeface="+mn-ea"/>
-                <a:cs typeface="+mn-cs"/>
-              </a:defRPr>
-            </a:lvl9pPr>
-          </a:lstStyle>
-          <a:p>
-            <a:pPr algn="just"/>
-            <a:r>
-              <a:rPr lang="de-DE" sz="2400" dirty="0" smtClean="0"/>
-              <a:t>Lösung</a:t>
-            </a:r>
-          </a:p>
-          <a:p>
-            <a:pPr lvl="1" algn="just"/>
-            <a:r>
-              <a:rPr lang="de-DE" sz="2000" dirty="0" smtClean="0"/>
-              <a:t>Wegen neuem Konzept</a:t>
-            </a:r>
-          </a:p>
-          <a:p>
-            <a:pPr lvl="1" algn="just"/>
-            <a:r>
-              <a:rPr lang="de-DE" sz="2000" dirty="0" smtClean="0"/>
-              <a:t>Gegen die Zeit</a:t>
-            </a:r>
-          </a:p>
-          <a:p>
-            <a:pPr lvl="1" algn="just"/>
-            <a:r>
-              <a:rPr lang="de-DE" sz="2000" dirty="0" smtClean="0"/>
-              <a:t>Nur noch das Speed-Power </a:t>
-            </a:r>
-            <a:r>
-              <a:rPr lang="de-DE" sz="2000" dirty="0" err="1" smtClean="0"/>
-              <a:t>Up</a:t>
-            </a:r>
-            <a:endParaRPr lang="de-DE" sz="1600" dirty="0" smtClean="0"/>
-          </a:p>
-        </p:txBody>
-      </p:sp>
-      <p:pic>
-        <p:nvPicPr>
-          <p:cNvPr id="2050" name="Picture 2" descr="D:\Nils\Desktop\Tron-Light-Bike-Race.jpg"/>
-          <p:cNvPicPr>
-            <a:picLocks noChangeAspect="1" noChangeArrowheads="1"/>
-          </p:cNvPicPr>
-          <p:nvPr/>
-        </p:nvPicPr>
-        <p:blipFill rotWithShape="1">
-          <a:blip r:embed="rId2" cstate="print">
-            <a:extLst>
-              <a:ext uri="{28A0092B-C50C-407E-A947-70E740481C1C}">
-                <a14:useLocalDpi xmlns:a14="http://schemas.microsoft.com/office/drawing/2010/main" val="0"/>
-              </a:ext>
-            </a:extLst>
-          </a:blip>
-          <a:srcRect l="6322" r="16490"/>
-          <a:stretch/>
-        </p:blipFill>
-        <p:spPr bwMode="auto">
-          <a:xfrm>
-            <a:off x="1435251" y="3698545"/>
-            <a:ext cx="4965549" cy="2682092"/>
-          </a:xfrm>
-          <a:prstGeom prst="rect">
-            <a:avLst/>
-          </a:prstGeom>
-          <a:noFill/>
-          <a:extLst>
-            <a:ext uri="{909E8E84-426E-40DD-AFC4-6F175D3DCCD1}">
-              <a14:hiddenFill xmlns:a14="http://schemas.microsoft.com/office/drawing/2010/main">
-                <a:solidFill>
-                  <a:srgbClr val="FFFFFF"/>
-                </a:solidFill>
-              </a14:hiddenFill>
-            </a:ext>
-          </a:extLst>
-        </p:spPr>
-      </p:pic>
-      <p:sp>
-        <p:nvSpPr>
-          <p:cNvPr id="6" name="Textfeld 5"/>
-          <p:cNvSpPr txBox="1"/>
-          <p:nvPr/>
-        </p:nvSpPr>
-        <p:spPr>
-          <a:xfrm>
-            <a:off x="1460314" y="6387149"/>
-            <a:ext cx="3862313" cy="369332"/>
-          </a:xfrm>
-          <a:prstGeom prst="rect">
-            <a:avLst/>
-          </a:prstGeom>
-          <a:noFill/>
-        </p:spPr>
-        <p:txBody>
-          <a:bodyPr wrap="square" rtlCol="0">
-            <a:spAutoFit/>
-          </a:bodyPr>
-          <a:lstStyle/>
-          <a:p>
-            <a:r>
-              <a:rPr lang="de-DE" dirty="0" err="1" smtClean="0"/>
-              <a:t>Gif</a:t>
-            </a:r>
-            <a:r>
-              <a:rPr lang="de-DE" dirty="0" smtClean="0"/>
-              <a:t> Bild – Speed-Power </a:t>
-            </a:r>
-            <a:r>
-              <a:rPr lang="de-DE" dirty="0" err="1" smtClean="0"/>
-              <a:t>Up</a:t>
-            </a:r>
-            <a:r>
-              <a:rPr lang="de-DE" dirty="0" smtClean="0"/>
-              <a:t> in Aktion</a:t>
-            </a:r>
-            <a:endParaRPr lang="de-DE" dirty="0"/>
-          </a:p>
-        </p:txBody>
-      </p:sp>
-    </p:spTree>
-    <p:extLst>
-      <p:ext uri="{BB962C8B-B14F-4D97-AF65-F5344CB8AC3E}">
-        <p14:creationId xmlns:p14="http://schemas.microsoft.com/office/powerpoint/2010/main" val="4272078257"/>
       </p:ext>
     </p:extLst>
   </p:cSld>
@@ -13292,7 +13570,7 @@
   <a:extraClrSchemeLst/>
   <a:extLst>
     <a:ext uri="{05A4C25C-085E-4340-85A3-A5531E510DB2}">
-      <thm15:themeFamily xmlns:thm15="http://schemas.microsoft.com/office/thememl/2012/main" xmlns="" name="Fulda Master" id="{74D752EF-3FAA-4935-ABB4-7B74A58079FF}" vid="{C97248B2-61E8-49D9-A36C-898FD5117E19}"/>
+      <thm15:themeFamily xmlns="" xmlns:thm15="http://schemas.microsoft.com/office/thememl/2012/main" name="Fulda Master" id="{74D752EF-3FAA-4935-ABB4-7B74A58079FF}" vid="{C97248B2-61E8-49D9-A36C-898FD5117E19}"/>
     </a:ext>
   </a:extLst>
 </a:theme>

</xml_diff>